<commit_message>
web 102 week 4 review update
</commit_message>
<xml_diff>
--- a/Buttons/Review.pptx
+++ b/Buttons/Review.pptx
@@ -5,25 +5,26 @@
     <p:sldMasterId id="2147483648" r:id="rId1"/>
   </p:sldMasterIdLst>
   <p:notesMasterIdLst>
-    <p:notesMasterId r:id="rId18"/>
+    <p:notesMasterId r:id="rId19"/>
   </p:notesMasterIdLst>
   <p:sldIdLst>
     <p:sldId id="258" r:id="rId2"/>
-    <p:sldId id="307" r:id="rId3"/>
-    <p:sldId id="308" r:id="rId4"/>
-    <p:sldId id="309" r:id="rId5"/>
-    <p:sldId id="310" r:id="rId6"/>
-    <p:sldId id="311" r:id="rId7"/>
-    <p:sldId id="312" r:id="rId8"/>
-    <p:sldId id="313" r:id="rId9"/>
-    <p:sldId id="314" r:id="rId10"/>
-    <p:sldId id="315" r:id="rId11"/>
-    <p:sldId id="316" r:id="rId12"/>
-    <p:sldId id="320" r:id="rId13"/>
-    <p:sldId id="321" r:id="rId14"/>
-    <p:sldId id="317" r:id="rId15"/>
-    <p:sldId id="318" r:id="rId16"/>
-    <p:sldId id="319" r:id="rId17"/>
+    <p:sldId id="322" r:id="rId3"/>
+    <p:sldId id="307" r:id="rId4"/>
+    <p:sldId id="308" r:id="rId5"/>
+    <p:sldId id="309" r:id="rId6"/>
+    <p:sldId id="310" r:id="rId7"/>
+    <p:sldId id="311" r:id="rId8"/>
+    <p:sldId id="312" r:id="rId9"/>
+    <p:sldId id="313" r:id="rId10"/>
+    <p:sldId id="314" r:id="rId11"/>
+    <p:sldId id="315" r:id="rId12"/>
+    <p:sldId id="316" r:id="rId13"/>
+    <p:sldId id="320" r:id="rId14"/>
+    <p:sldId id="321" r:id="rId15"/>
+    <p:sldId id="317" r:id="rId16"/>
+    <p:sldId id="318" r:id="rId17"/>
+    <p:sldId id="319" r:id="rId18"/>
   </p:sldIdLst>
   <p:sldSz cx="12192000" cy="6858000"/>
   <p:notesSz cx="6858000" cy="9144000"/>
@@ -223,7 +224,7 @@
           <a:p>
             <a:fld id="{19104133-B5B0-4351-8158-4F0E5EB1E2BF}" type="datetimeFigureOut">
               <a:rPr lang="en-US" smtClean="0"/>
-              <a:t>9/6/2022</a:t>
+              <a:t>1/31/2024</a:t>
             </a:fld>
             <a:endParaRPr lang="en-US"/>
           </a:p>
@@ -566,7 +567,7 @@
           <a:p>
             <a:fld id="{DEC8F7F9-57EC-49CF-9FCD-2B781E4B449F}" type="slidenum">
               <a:rPr lang="en-US" smtClean="0"/>
-              <a:t>2</a:t>
+              <a:t>3</a:t>
             </a:fld>
             <a:endParaRPr lang="en-US"/>
           </a:p>
@@ -763,7 +764,7 @@
           <a:p>
             <a:fld id="{DEC8F7F9-57EC-49CF-9FCD-2B781E4B449F}" type="slidenum">
               <a:rPr lang="en-US" smtClean="0"/>
-              <a:t>9</a:t>
+              <a:t>10</a:t>
             </a:fld>
             <a:endParaRPr lang="en-US"/>
           </a:p>
@@ -847,7 +848,7 @@
           <a:p>
             <a:fld id="{DEC8F7F9-57EC-49CF-9FCD-2B781E4B449F}" type="slidenum">
               <a:rPr lang="en-US" smtClean="0"/>
-              <a:t>11</a:t>
+              <a:t>12</a:t>
             </a:fld>
             <a:endParaRPr lang="en-US"/>
           </a:p>
@@ -931,7 +932,7 @@
           <a:p>
             <a:fld id="{DEC8F7F9-57EC-49CF-9FCD-2B781E4B449F}" type="slidenum">
               <a:rPr lang="en-US" smtClean="0"/>
-              <a:t>13</a:t>
+              <a:t>14</a:t>
             </a:fld>
             <a:endParaRPr lang="en-US"/>
           </a:p>
@@ -1023,7 +1024,7 @@
           <a:p>
             <a:fld id="{DEC8F7F9-57EC-49CF-9FCD-2B781E4B449F}" type="slidenum">
               <a:rPr lang="en-US" smtClean="0"/>
-              <a:t>14</a:t>
+              <a:t>15</a:t>
             </a:fld>
             <a:endParaRPr lang="en-US"/>
           </a:p>
@@ -1224,7 +1225,7 @@
             <a:fld id="{1C2D31DE-C454-491C-B5C3-F097855E3DF7}" type="datetime4">
               <a:rPr lang="en-US" smtClean="0"/>
               <a:pPr/>
-              <a:t>September 6, 2022</a:t>
+              <a:t>January 31, 2024</a:t>
             </a:fld>
             <a:endParaRPr lang="en-US" dirty="0"/>
           </a:p>
@@ -4616,7 +4617,7 @@
           <a:p>
             <a:fld id="{5958763E-B898-436D-883D-03711491D54A}" type="datetimeFigureOut">
               <a:rPr lang="en-US" smtClean="0"/>
-              <a:t>9/6/2022</a:t>
+              <a:t>1/31/2024</a:t>
             </a:fld>
             <a:endParaRPr lang="en-US"/>
           </a:p>
@@ -4809,7 +4810,7 @@
           <a:p>
             <a:fld id="{5958763E-B898-436D-883D-03711491D54A}" type="datetimeFigureOut">
               <a:rPr lang="en-US" smtClean="0"/>
-              <a:t>9/6/2022</a:t>
+              <a:t>1/31/2024</a:t>
             </a:fld>
             <a:endParaRPr lang="en-US"/>
           </a:p>
@@ -5059,7 +5060,7 @@
           <a:p>
             <a:fld id="{5958763E-B898-436D-883D-03711491D54A}" type="datetimeFigureOut">
               <a:rPr lang="en-US" smtClean="0"/>
-              <a:t>9/6/2022</a:t>
+              <a:t>1/31/2024</a:t>
             </a:fld>
             <a:endParaRPr lang="en-US"/>
           </a:p>
@@ -5407,7 +5408,7 @@
           <a:p>
             <a:fld id="{5958763E-B898-436D-883D-03711491D54A}" type="datetimeFigureOut">
               <a:rPr lang="en-US" smtClean="0"/>
-              <a:t>9/6/2022</a:t>
+              <a:t>1/31/2024</a:t>
             </a:fld>
             <a:endParaRPr lang="en-US"/>
           </a:p>
@@ -5823,7 +5824,7 @@
           <a:p>
             <a:fld id="{5958763E-B898-436D-883D-03711491D54A}" type="datetimeFigureOut">
               <a:rPr lang="en-US" smtClean="0"/>
-              <a:t>9/6/2022</a:t>
+              <a:t>1/31/2024</a:t>
             </a:fld>
             <a:endParaRPr lang="en-US"/>
           </a:p>
@@ -6324,7 +6325,7 @@
           <a:p>
             <a:fld id="{5958763E-B898-436D-883D-03711491D54A}" type="datetimeFigureOut">
               <a:rPr lang="en-US" smtClean="0"/>
-              <a:t>9/6/2022</a:t>
+              <a:t>1/31/2024</a:t>
             </a:fld>
             <a:endParaRPr lang="en-US"/>
           </a:p>
@@ -6775,7 +6776,7 @@
           <a:p>
             <a:fld id="{5958763E-B898-436D-883D-03711491D54A}" type="datetimeFigureOut">
               <a:rPr lang="en-US" smtClean="0"/>
-              <a:t>9/6/2022</a:t>
+              <a:t>1/31/2024</a:t>
             </a:fld>
             <a:endParaRPr lang="en-US"/>
           </a:p>
@@ -7386,7 +7387,7 @@
           <a:p>
             <a:fld id="{5958763E-B898-436D-883D-03711491D54A}" type="datetimeFigureOut">
               <a:rPr lang="en-US" smtClean="0"/>
-              <a:t>9/6/2022</a:t>
+              <a:t>1/31/2024</a:t>
             </a:fld>
             <a:endParaRPr lang="en-US"/>
           </a:p>
@@ -8157,7 +8158,7 @@
           <a:p>
             <a:fld id="{5958763E-B898-436D-883D-03711491D54A}" type="datetimeFigureOut">
               <a:rPr lang="en-US" smtClean="0"/>
-              <a:t>9/6/2022</a:t>
+              <a:t>1/31/2024</a:t>
             </a:fld>
             <a:endParaRPr lang="en-US"/>
           </a:p>
@@ -8261,7 +8262,7 @@
           <a:p>
             <a:fld id="{5958763E-B898-436D-883D-03711491D54A}" type="datetimeFigureOut">
               <a:rPr lang="en-US" smtClean="0"/>
-              <a:t>9/6/2022</a:t>
+              <a:t>1/31/2024</a:t>
             </a:fld>
             <a:endParaRPr lang="en-US"/>
           </a:p>
@@ -8588,7 +8589,7 @@
             <a:fld id="{1C2D31DE-C454-491C-B5C3-F097855E3DF7}" type="datetime4">
               <a:rPr lang="en-US" smtClean="0"/>
               <a:pPr/>
-              <a:t>September 6, 2022</a:t>
+              <a:t>January 31, 2024</a:t>
             </a:fld>
             <a:endParaRPr lang="en-US" dirty="0"/>
           </a:p>
@@ -11740,7 +11741,7 @@
           <a:p>
             <a:fld id="{5958763E-B898-436D-883D-03711491D54A}" type="datetimeFigureOut">
               <a:rPr lang="en-US" smtClean="0"/>
-              <a:t>9/6/2022</a:t>
+              <a:t>1/31/2024</a:t>
             </a:fld>
             <a:endParaRPr lang="en-US"/>
           </a:p>
@@ -11864,7 +11865,7 @@
           <a:p>
             <a:fld id="{5958763E-B898-436D-883D-03711491D54A}" type="datetimeFigureOut">
               <a:rPr lang="en-US" smtClean="0"/>
-              <a:t>9/6/2022</a:t>
+              <a:t>1/31/2024</a:t>
             </a:fld>
             <a:endParaRPr lang="en-US"/>
           </a:p>
@@ -11988,7 +11989,7 @@
           <a:p>
             <a:fld id="{5958763E-B898-436D-883D-03711491D54A}" type="datetimeFigureOut">
               <a:rPr lang="en-US" smtClean="0"/>
-              <a:t>9/6/2022</a:t>
+              <a:t>1/31/2024</a:t>
             </a:fld>
             <a:endParaRPr lang="en-US"/>
           </a:p>
@@ -12112,7 +12113,7 @@
           <a:p>
             <a:fld id="{5958763E-B898-436D-883D-03711491D54A}" type="datetimeFigureOut">
               <a:rPr lang="en-US" smtClean="0"/>
-              <a:t>9/6/2022</a:t>
+              <a:t>1/31/2024</a:t>
             </a:fld>
             <a:endParaRPr lang="en-US"/>
           </a:p>
@@ -12236,7 +12237,7 @@
           <a:p>
             <a:fld id="{5958763E-B898-436D-883D-03711491D54A}" type="datetimeFigureOut">
               <a:rPr lang="en-US" smtClean="0"/>
-              <a:t>9/6/2022</a:t>
+              <a:t>1/31/2024</a:t>
             </a:fld>
             <a:endParaRPr lang="en-US"/>
           </a:p>
@@ -12360,7 +12361,7 @@
           <a:p>
             <a:fld id="{5958763E-B898-436D-883D-03711491D54A}" type="datetimeFigureOut">
               <a:rPr lang="en-US" smtClean="0"/>
-              <a:t>9/6/2022</a:t>
+              <a:t>1/31/2024</a:t>
             </a:fld>
             <a:endParaRPr lang="en-US"/>
           </a:p>
@@ -12484,7 +12485,7 @@
           <a:p>
             <a:fld id="{5958763E-B898-436D-883D-03711491D54A}" type="datetimeFigureOut">
               <a:rPr lang="en-US" smtClean="0"/>
-              <a:t>9/6/2022</a:t>
+              <a:t>1/31/2024</a:t>
             </a:fld>
             <a:endParaRPr lang="en-US"/>
           </a:p>
@@ -12608,7 +12609,7 @@
           <a:p>
             <a:fld id="{5958763E-B898-436D-883D-03711491D54A}" type="datetimeFigureOut">
               <a:rPr lang="en-US" smtClean="0"/>
-              <a:t>9/6/2022</a:t>
+              <a:t>1/31/2024</a:t>
             </a:fld>
             <a:endParaRPr lang="en-US"/>
           </a:p>
@@ -12741,7 +12742,7 @@
           <a:p>
             <a:fld id="{5958763E-B898-436D-883D-03711491D54A}" type="datetimeFigureOut">
               <a:rPr lang="en-US" smtClean="0"/>
-              <a:t>9/6/2022</a:t>
+              <a:t>1/31/2024</a:t>
             </a:fld>
             <a:endParaRPr lang="en-US"/>
           </a:p>
@@ -16080,7 +16081,7 @@
             <a:fld id="{1C2D31DE-C454-491C-B5C3-F097855E3DF7}" type="datetime4">
               <a:rPr lang="en-US" smtClean="0"/>
               <a:pPr/>
-              <a:t>September 6, 2022</a:t>
+              <a:t>January 31, 2024</a:t>
             </a:fld>
             <a:endParaRPr lang="en-US" dirty="0"/>
           </a:p>
@@ -28316,7 +28317,7 @@
           <a:p>
             <a:fld id="{5958763E-B898-436D-883D-03711491D54A}" type="datetimeFigureOut">
               <a:rPr lang="en-US" smtClean="0"/>
-              <a:t>9/6/2022</a:t>
+              <a:t>1/31/2024</a:t>
             </a:fld>
             <a:endParaRPr lang="en-US"/>
           </a:p>
@@ -28718,7 +28719,7 @@
           <a:p>
             <a:fld id="{5958763E-B898-436D-883D-03711491D54A}" type="datetimeFigureOut">
               <a:rPr lang="en-US" smtClean="0"/>
-              <a:t>9/6/2022</a:t>
+              <a:t>1/31/2024</a:t>
             </a:fld>
             <a:endParaRPr lang="en-US"/>
           </a:p>
@@ -29012,7 +29013,7 @@
           <a:p>
             <a:fld id="{5958763E-B898-436D-883D-03711491D54A}" type="datetimeFigureOut">
               <a:rPr lang="en-US" smtClean="0"/>
-              <a:t>9/6/2022</a:t>
+              <a:t>1/31/2024</a:t>
             </a:fld>
             <a:endParaRPr lang="en-US"/>
           </a:p>
@@ -29213,7 +29214,7 @@
           <a:p>
             <a:fld id="{5958763E-B898-436D-883D-03711491D54A}" type="datetimeFigureOut">
               <a:rPr lang="en-US" smtClean="0"/>
-              <a:t>9/6/2022</a:t>
+              <a:t>1/31/2024</a:t>
             </a:fld>
             <a:endParaRPr lang="en-US"/>
           </a:p>
@@ -29474,7 +29475,7 @@
           <a:p>
             <a:fld id="{5958763E-B898-436D-883D-03711491D54A}" type="datetimeFigureOut">
               <a:rPr lang="en-US" smtClean="0"/>
-              <a:t>9/6/2022</a:t>
+              <a:t>1/31/2024</a:t>
             </a:fld>
             <a:endParaRPr lang="en-US"/>
           </a:p>
@@ -29982,7 +29983,7 @@
           <a:p>
             <a:fld id="{5958763E-B898-436D-883D-03711491D54A}" type="datetimeFigureOut">
               <a:rPr lang="en-US" smtClean="0"/>
-              <a:t>9/6/2022</a:t>
+              <a:t>1/31/2024</a:t>
             </a:fld>
             <a:endParaRPr lang="en-US"/>
           </a:p>
@@ -30461,7 +30462,7 @@
           <a:p>
             <a:fld id="{5958763E-B898-436D-883D-03711491D54A}" type="datetimeFigureOut">
               <a:rPr lang="en-US" smtClean="0"/>
-              <a:t>9/6/2022</a:t>
+              <a:t>1/31/2024</a:t>
             </a:fld>
             <a:endParaRPr lang="en-US"/>
           </a:p>
@@ -31280,7 +31281,7 @@
           <a:p>
             <a:fld id="{5958763E-B898-436D-883D-03711491D54A}" type="datetimeFigureOut">
               <a:rPr lang="en-US" smtClean="0"/>
-              <a:t>9/6/2022</a:t>
+              <a:t>1/31/2024</a:t>
             </a:fld>
             <a:endParaRPr lang="en-US"/>
           </a:p>
@@ -31481,7 +31482,7 @@
           <a:p>
             <a:fld id="{5958763E-B898-436D-883D-03711491D54A}" type="datetimeFigureOut">
               <a:rPr lang="en-US" smtClean="0"/>
-              <a:t>9/6/2022</a:t>
+              <a:t>1/31/2024</a:t>
             </a:fld>
             <a:endParaRPr lang="en-US"/>
           </a:p>
@@ -31816,7 +31817,7 @@
           <a:p>
             <a:fld id="{5958763E-B898-436D-883D-03711491D54A}" type="datetimeFigureOut">
               <a:rPr lang="en-US" smtClean="0"/>
-              <a:t>9/6/2022</a:t>
+              <a:t>1/31/2024</a:t>
             </a:fld>
             <a:endParaRPr lang="en-US"/>
           </a:p>
@@ -32046,7 +32047,7 @@
           <a:p>
             <a:fld id="{5958763E-B898-436D-883D-03711491D54A}" type="datetimeFigureOut">
               <a:rPr lang="en-US" smtClean="0"/>
-              <a:t>9/6/2022</a:t>
+              <a:t>1/31/2024</a:t>
             </a:fld>
             <a:endParaRPr lang="en-US"/>
           </a:p>
@@ -32290,7 +32291,7 @@
           <a:p>
             <a:fld id="{5958763E-B898-436D-883D-03711491D54A}" type="datetimeFigureOut">
               <a:rPr lang="en-US" smtClean="0"/>
-              <a:t>9/6/2022</a:t>
+              <a:t>1/31/2024</a:t>
             </a:fld>
             <a:endParaRPr lang="en-US"/>
           </a:p>
@@ -35868,6 +35869,266 @@
             <p:ph type="title"/>
           </p:nvPr>
         </p:nvSpPr>
+        <p:spPr/>
+        <p:txBody>
+          <a:bodyPr/>
+          <a:lstStyle/>
+          <a:p>
+            <a:r>
+              <a:rPr lang="en-US" dirty="0"/>
+              <a:t>Answer</a:t>
+            </a:r>
+          </a:p>
+        </p:txBody>
+      </p:sp>
+      <p:sp>
+        <p:nvSpPr>
+          <p:cNvPr id="3" name="Content Placeholder 2"/>
+          <p:cNvSpPr>
+            <a:spLocks noGrp="1"/>
+          </p:cNvSpPr>
+          <p:nvPr>
+            <p:ph idx="1"/>
+          </p:nvPr>
+        </p:nvSpPr>
+        <p:spPr/>
+        <p:txBody>
+          <a:bodyPr anchor="ctr">
+            <a:normAutofit/>
+          </a:bodyPr>
+          <a:lstStyle/>
+          <a:p>
+            <a:pPr marL="57150" indent="0" algn="ctr">
+              <a:buNone/>
+            </a:pPr>
+            <a:r>
+              <a:rPr lang="en-US" sz="3200" dirty="0">
+                <a:solidFill>
+                  <a:srgbClr val="800000"/>
+                </a:solidFill>
+                <a:latin typeface="Consolas" panose="020B0609020204030204" pitchFamily="49" charset="0"/>
+              </a:rPr>
+              <a:t>&lt;button</a:t>
+            </a:r>
+            <a:r>
+              <a:rPr lang="en-US" sz="3200" dirty="0">
+                <a:solidFill>
+                  <a:srgbClr val="000000"/>
+                </a:solidFill>
+                <a:latin typeface="Consolas" panose="020B0609020204030204" pitchFamily="49" charset="0"/>
+              </a:rPr>
+              <a:t> </a:t>
+            </a:r>
+            <a:r>
+              <a:rPr lang="en-US" sz="3200" dirty="0" err="1">
+                <a:solidFill>
+                  <a:srgbClr val="FF0000"/>
+                </a:solidFill>
+                <a:latin typeface="Consolas" panose="020B0609020204030204" pitchFamily="49" charset="0"/>
+              </a:rPr>
+              <a:t>onclick</a:t>
+            </a:r>
+            <a:r>
+              <a:rPr lang="en-US" sz="3200" dirty="0">
+                <a:solidFill>
+                  <a:srgbClr val="000000"/>
+                </a:solidFill>
+                <a:latin typeface="Consolas" panose="020B0609020204030204" pitchFamily="49" charset="0"/>
+              </a:rPr>
+              <a:t>=</a:t>
+            </a:r>
+            <a:r>
+              <a:rPr lang="en-US" sz="3200" dirty="0">
+                <a:solidFill>
+                  <a:srgbClr val="0000FF"/>
+                </a:solidFill>
+                <a:latin typeface="Consolas" panose="020B0609020204030204" pitchFamily="49" charset="0"/>
+              </a:rPr>
+              <a:t>"</a:t>
+            </a:r>
+            <a:r>
+              <a:rPr lang="en-US" sz="3200" dirty="0" err="1">
+                <a:solidFill>
+                  <a:srgbClr val="0000FF"/>
+                </a:solidFill>
+                <a:latin typeface="Consolas" panose="020B0609020204030204" pitchFamily="49" charset="0"/>
+              </a:rPr>
+              <a:t>SendMessage</a:t>
+            </a:r>
+            <a:r>
+              <a:rPr lang="en-US" sz="3200" dirty="0">
+                <a:solidFill>
+                  <a:srgbClr val="0000FF"/>
+                </a:solidFill>
+                <a:latin typeface="Consolas" panose="020B0609020204030204" pitchFamily="49" charset="0"/>
+              </a:rPr>
+              <a:t>()"</a:t>
+            </a:r>
+            <a:r>
+              <a:rPr lang="en-US" sz="3200" dirty="0">
+                <a:solidFill>
+                  <a:srgbClr val="800000"/>
+                </a:solidFill>
+                <a:latin typeface="Consolas" panose="020B0609020204030204" pitchFamily="49" charset="0"/>
+              </a:rPr>
+              <a:t>&gt;</a:t>
+            </a:r>
+            <a:r>
+              <a:rPr lang="en-US" sz="3200" dirty="0">
+                <a:solidFill>
+                  <a:srgbClr val="000000"/>
+                </a:solidFill>
+                <a:latin typeface="Consolas" panose="020B0609020204030204" pitchFamily="49" charset="0"/>
+              </a:rPr>
+              <a:t>Click Me!</a:t>
+            </a:r>
+            <a:r>
+              <a:rPr lang="en-US" sz="3200" dirty="0">
+                <a:solidFill>
+                  <a:srgbClr val="800000"/>
+                </a:solidFill>
+                <a:latin typeface="Consolas" panose="020B0609020204030204" pitchFamily="49" charset="0"/>
+              </a:rPr>
+              <a:t>&lt;/button&gt;</a:t>
+            </a:r>
+          </a:p>
+          <a:p>
+            <a:pPr marL="57150" indent="0" algn="ctr">
+              <a:buNone/>
+            </a:pPr>
+            <a:endParaRPr lang="en-US" sz="3200" dirty="0">
+              <a:solidFill>
+                <a:srgbClr val="000000"/>
+              </a:solidFill>
+              <a:latin typeface="Consolas" panose="020B0609020204030204" pitchFamily="49" charset="0"/>
+            </a:endParaRPr>
+          </a:p>
+        </p:txBody>
+      </p:sp>
+      <p:sp>
+        <p:nvSpPr>
+          <p:cNvPr id="4" name="Rectangle 3"/>
+          <p:cNvSpPr/>
+          <p:nvPr/>
+        </p:nvSpPr>
+        <p:spPr bwMode="auto">
+          <a:xfrm>
+            <a:off x="2209800" y="2857500"/>
+            <a:ext cx="5257800" cy="1257300"/>
+          </a:xfrm>
+          <a:prstGeom prst="rect">
+            <a:avLst/>
+          </a:prstGeom>
+          <a:solidFill>
+            <a:schemeClr val="accent1">
+              <a:alpha val="27000"/>
+            </a:schemeClr>
+          </a:solidFill>
+          <a:ln w="31750">
+            <a:solidFill>
+              <a:schemeClr val="accent1"/>
+            </a:solidFill>
+            <a:miter lim="800000"/>
+            <a:headEnd type="none" w="med" len="med"/>
+            <a:tailEnd type="none" w="med" len="med"/>
+          </a:ln>
+          <a:effectLst/>
+        </p:spPr>
+        <p:style>
+          <a:lnRef idx="1">
+            <a:schemeClr val="accent2"/>
+          </a:lnRef>
+          <a:fillRef idx="3">
+            <a:schemeClr val="accent2"/>
+          </a:fillRef>
+          <a:effectRef idx="2">
+            <a:schemeClr val="accent2"/>
+          </a:effectRef>
+          <a:fontRef idx="minor">
+            <a:schemeClr val="lt1"/>
+          </a:fontRef>
+        </p:style>
+        <p:txBody>
+          <a:bodyPr rot="0" spcFirstLastPara="0" vertOverflow="overflow" horzOverflow="overflow" vert="horz" wrap="square" lIns="182880" tIns="146304" rIns="182880" bIns="146304" numCol="1" spcCol="0" rtlCol="0" fromWordArt="0" anchor="t" anchorCtr="0" forceAA="0" compatLnSpc="1">
+            <a:prstTxWarp prst="textNoShape">
+              <a:avLst/>
+            </a:prstTxWarp>
+            <a:noAutofit/>
+          </a:bodyPr>
+          <a:lstStyle/>
+          <a:p>
+            <a:pPr algn="ctr" defTabSz="932472" fontAlgn="base">
+              <a:lnSpc>
+                <a:spcPct val="90000"/>
+              </a:lnSpc>
+              <a:spcBef>
+                <a:spcPct val="0"/>
+              </a:spcBef>
+              <a:spcAft>
+                <a:spcPct val="0"/>
+              </a:spcAft>
+            </a:pPr>
+            <a:endParaRPr lang="en-US" sz="2400" dirty="0" err="1">
+              <a:gradFill>
+                <a:gsLst>
+                  <a:gs pos="0">
+                    <a:srgbClr val="FFFFFF"/>
+                  </a:gs>
+                  <a:gs pos="100000">
+                    <a:srgbClr val="FFFFFF"/>
+                  </a:gs>
+                </a:gsLst>
+                <a:lin ang="5400000" scaled="0"/>
+              </a:gradFill>
+              <a:ea typeface="Segoe UI" pitchFamily="34" charset="0"/>
+              <a:cs typeface="Segoe UI" pitchFamily="34" charset="0"/>
+            </a:endParaRPr>
+          </a:p>
+        </p:txBody>
+      </p:sp>
+    </p:spTree>
+    <p:extLst>
+      <p:ext uri="{BB962C8B-B14F-4D97-AF65-F5344CB8AC3E}">
+        <p14:creationId xmlns:p14="http://schemas.microsoft.com/office/powerpoint/2010/main" val="587035046"/>
+      </p:ext>
+    </p:extLst>
+  </p:cSld>
+  <p:clrMapOvr>
+    <a:masterClrMapping/>
+  </p:clrMapOvr>
+  <p:transition>
+    <p:fade/>
+  </p:transition>
+</p:sld>
+</file>
+
+<file path=ppt/slides/slide11.xml><?xml version="1.0" encoding="utf-8"?>
+<p:sld xmlns:a="http://schemas.openxmlformats.org/drawingml/2006/main" xmlns:r="http://schemas.openxmlformats.org/officeDocument/2006/relationships" xmlns:p="http://schemas.openxmlformats.org/presentationml/2006/main">
+  <p:cSld>
+    <p:spTree>
+      <p:nvGrpSpPr>
+        <p:cNvPr id="1" name=""/>
+        <p:cNvGrpSpPr/>
+        <p:nvPr/>
+      </p:nvGrpSpPr>
+      <p:grpSpPr>
+        <a:xfrm>
+          <a:off x="0" y="0"/>
+          <a:ext cx="0" cy="0"/>
+          <a:chOff x="0" y="0"/>
+          <a:chExt cx="0" cy="0"/>
+        </a:xfrm>
+      </p:grpSpPr>
+      <p:sp>
+        <p:nvSpPr>
+          <p:cNvPr id="2" name="Title 1"/>
+          <p:cNvSpPr>
+            <a:spLocks noGrp="1"/>
+          </p:cNvSpPr>
+          <p:nvPr>
+            <p:ph type="title"/>
+          </p:nvPr>
+        </p:nvSpPr>
         <p:spPr>
           <a:xfrm>
             <a:off x="381000" y="182880"/>
@@ -36167,7 +36428,7 @@
 </p:sld>
 </file>
 
-<file path=ppt/slides/slide11.xml><?xml version="1.0" encoding="utf-8"?>
+<file path=ppt/slides/slide12.xml><?xml version="1.0" encoding="utf-8"?>
 <p:sld xmlns:a="http://schemas.openxmlformats.org/drawingml/2006/main" xmlns:r="http://schemas.openxmlformats.org/officeDocument/2006/relationships" xmlns:p="http://schemas.openxmlformats.org/presentationml/2006/main">
   <p:cSld>
     <p:spTree>
@@ -36331,7 +36592,7 @@
 </p:sld>
 </file>
 
-<file path=ppt/slides/slide12.xml><?xml version="1.0" encoding="utf-8"?>
+<file path=ppt/slides/slide13.xml><?xml version="1.0" encoding="utf-8"?>
 <p:sld xmlns:a="http://schemas.openxmlformats.org/drawingml/2006/main" xmlns:r="http://schemas.openxmlformats.org/officeDocument/2006/relationships" xmlns:p="http://schemas.openxmlformats.org/presentationml/2006/main">
   <p:cSld>
     <p:spTree>
@@ -36517,7 +36778,7 @@
 </p:sld>
 </file>
 
-<file path=ppt/slides/slide13.xml><?xml version="1.0" encoding="utf-8"?>
+<file path=ppt/slides/slide14.xml><?xml version="1.0" encoding="utf-8"?>
 <p:sld xmlns:a="http://schemas.openxmlformats.org/drawingml/2006/main" xmlns:r="http://schemas.openxmlformats.org/officeDocument/2006/relationships" xmlns:p="http://schemas.openxmlformats.org/presentationml/2006/main">
   <p:cSld>
     <p:spTree>
@@ -36671,7 +36932,7 @@
 </p:sld>
 </file>
 
-<file path=ppt/slides/slide14.xml><?xml version="1.0" encoding="utf-8"?>
+<file path=ppt/slides/slide15.xml><?xml version="1.0" encoding="utf-8"?>
 <p:sld xmlns:a="http://schemas.openxmlformats.org/drawingml/2006/main" xmlns:r="http://schemas.openxmlformats.org/officeDocument/2006/relationships" xmlns:p="http://schemas.openxmlformats.org/presentationml/2006/main">
   <p:cSld>
     <p:spTree>
@@ -36731,7 +36992,7 @@
 </p:sld>
 </file>
 
-<file path=ppt/slides/slide15.xml><?xml version="1.0" encoding="utf-8"?>
+<file path=ppt/slides/slide16.xml><?xml version="1.0" encoding="utf-8"?>
 <p:sld xmlns:a="http://schemas.openxmlformats.org/drawingml/2006/main" xmlns:r="http://schemas.openxmlformats.org/officeDocument/2006/relationships" xmlns:p="http://schemas.openxmlformats.org/presentationml/2006/main">
   <p:cSld>
     <p:spTree>
@@ -37177,7 +37438,7 @@
 </p:sld>
 </file>
 
-<file path=ppt/slides/slide16.xml><?xml version="1.0" encoding="utf-8"?>
+<file path=ppt/slides/slide17.xml><?xml version="1.0" encoding="utf-8"?>
 <p:sld xmlns:a="http://schemas.openxmlformats.org/drawingml/2006/main" xmlns:r="http://schemas.openxmlformats.org/officeDocument/2006/relationships" xmlns:p="http://schemas.openxmlformats.org/presentationml/2006/main">
   <p:cSld>
     <p:spTree>
@@ -37264,6 +37525,183 @@
 </file>
 
 <file path=ppt/slides/slide2.xml><?xml version="1.0" encoding="utf-8"?>
+<p:sld xmlns:a="http://schemas.openxmlformats.org/drawingml/2006/main" xmlns:r="http://schemas.openxmlformats.org/officeDocument/2006/relationships" xmlns:p="http://schemas.openxmlformats.org/presentationml/2006/main">
+  <p:cSld>
+    <p:spTree>
+      <p:nvGrpSpPr>
+        <p:cNvPr id="1" name=""/>
+        <p:cNvGrpSpPr/>
+        <p:nvPr/>
+      </p:nvGrpSpPr>
+      <p:grpSpPr>
+        <a:xfrm>
+          <a:off x="0" y="0"/>
+          <a:ext cx="0" cy="0"/>
+          <a:chOff x="0" y="0"/>
+          <a:chExt cx="0" cy="0"/>
+        </a:xfrm>
+      </p:grpSpPr>
+      <p:sp>
+        <p:nvSpPr>
+          <p:cNvPr id="2" name="Title 1">
+            <a:extLst>
+              <a:ext uri="{FF2B5EF4-FFF2-40B4-BE49-F238E27FC236}">
+                <a16:creationId xmlns:a16="http://schemas.microsoft.com/office/drawing/2014/main" id="{B3A6B399-C57C-7300-8C2B-E3261157A6CF}"/>
+              </a:ext>
+            </a:extLst>
+          </p:cNvPr>
+          <p:cNvSpPr>
+            <a:spLocks noGrp="1"/>
+          </p:cNvSpPr>
+          <p:nvPr>
+            <p:ph type="title"/>
+          </p:nvPr>
+        </p:nvSpPr>
+        <p:spPr/>
+        <p:txBody>
+          <a:bodyPr/>
+          <a:lstStyle/>
+          <a:p>
+            <a:r>
+              <a:rPr lang="en-US" dirty="0"/>
+              <a:t>TEAMS</a:t>
+            </a:r>
+          </a:p>
+        </p:txBody>
+      </p:sp>
+      <p:sp>
+        <p:nvSpPr>
+          <p:cNvPr id="3" name="Content Placeholder 2">
+            <a:extLst>
+              <a:ext uri="{FF2B5EF4-FFF2-40B4-BE49-F238E27FC236}">
+                <a16:creationId xmlns:a16="http://schemas.microsoft.com/office/drawing/2014/main" id="{7BBBC54D-5C08-40B0-64EA-F2598CF983C1}"/>
+              </a:ext>
+            </a:extLst>
+          </p:cNvPr>
+          <p:cNvSpPr>
+            <a:spLocks noGrp="1"/>
+          </p:cNvSpPr>
+          <p:nvPr>
+            <p:ph idx="1"/>
+          </p:nvPr>
+        </p:nvSpPr>
+        <p:spPr/>
+        <p:txBody>
+          <a:bodyPr/>
+          <a:lstStyle/>
+          <a:p>
+            <a:pPr marL="57150" indent="0">
+              <a:buNone/>
+            </a:pPr>
+            <a:r>
+              <a:rPr lang="en-US" b="1" dirty="0"/>
+              <a:t>Team 1: </a:t>
+            </a:r>
+            <a:r>
+              <a:rPr lang="en-US" b="1" dirty="0">
+                <a:hlinkClick r:id="rId2"/>
+              </a:rPr>
+              <a:t>https://replit.com/join/iacmabopuy-hylandoutreach</a:t>
+            </a:r>
+            <a:endParaRPr lang="en-US" b="1" dirty="0"/>
+          </a:p>
+          <a:p>
+            <a:pPr marL="57150" indent="0">
+              <a:buNone/>
+            </a:pPr>
+            <a:r>
+              <a:rPr lang="en-US" dirty="0"/>
+              <a:t>Name, Name, Name, Name</a:t>
+            </a:r>
+          </a:p>
+          <a:p>
+            <a:pPr marL="57150" indent="0">
+              <a:buNone/>
+            </a:pPr>
+            <a:endParaRPr lang="en-US" dirty="0"/>
+          </a:p>
+          <a:p>
+            <a:pPr marL="57150" indent="0">
+              <a:buNone/>
+            </a:pPr>
+            <a:r>
+              <a:rPr lang="en-US" b="1" dirty="0"/>
+              <a:t>Team 2: </a:t>
+            </a:r>
+            <a:r>
+              <a:rPr lang="en-US" b="1" dirty="0">
+                <a:hlinkClick r:id="rId3"/>
+              </a:rPr>
+              <a:t>https://replit.com/join/unymmgzsgy-hylandoutreach</a:t>
+            </a:r>
+            <a:endParaRPr lang="en-US" b="1" dirty="0"/>
+          </a:p>
+          <a:p>
+            <a:pPr marL="57150" indent="0">
+              <a:buNone/>
+            </a:pPr>
+            <a:r>
+              <a:rPr lang="en-US" dirty="0"/>
+              <a:t>Name, Name, Name, Name</a:t>
+            </a:r>
+          </a:p>
+          <a:p>
+            <a:pPr marL="57150" indent="0">
+              <a:buNone/>
+            </a:pPr>
+            <a:endParaRPr lang="en-US" dirty="0"/>
+          </a:p>
+          <a:p>
+            <a:pPr marL="57150" indent="0">
+              <a:buNone/>
+            </a:pPr>
+            <a:r>
+              <a:rPr lang="en-US" b="1" dirty="0"/>
+              <a:t>Team 3: </a:t>
+            </a:r>
+            <a:r>
+              <a:rPr lang="en-US" b="1" dirty="0">
+                <a:hlinkClick r:id="rId4"/>
+              </a:rPr>
+              <a:t>https://replit.com/join/tlxrtqvqmf-hylandoutreach</a:t>
+            </a:r>
+            <a:endParaRPr lang="en-US" b="1" dirty="0"/>
+          </a:p>
+          <a:p>
+            <a:pPr marL="57150" indent="0">
+              <a:buNone/>
+            </a:pPr>
+            <a:r>
+              <a:rPr lang="en-US"/>
+              <a:t>Name, Name, Name, Name</a:t>
+            </a:r>
+            <a:endParaRPr lang="en-US" dirty="0"/>
+          </a:p>
+          <a:p>
+            <a:pPr marL="57150" indent="0">
+              <a:buNone/>
+            </a:pPr>
+            <a:endParaRPr lang="en-US" dirty="0"/>
+          </a:p>
+        </p:txBody>
+      </p:sp>
+    </p:spTree>
+    <p:extLst>
+      <p:ext uri="{BB962C8B-B14F-4D97-AF65-F5344CB8AC3E}">
+        <p14:creationId xmlns:p14="http://schemas.microsoft.com/office/powerpoint/2010/main" val="2581119752"/>
+      </p:ext>
+    </p:extLst>
+  </p:cSld>
+  <p:clrMapOvr>
+    <a:masterClrMapping/>
+  </p:clrMapOvr>
+  <p:transition>
+    <p:fade/>
+  </p:transition>
+</p:sld>
+</file>
+
+<file path=ppt/slides/slide3.xml><?xml version="1.0" encoding="utf-8"?>
 <p:sld xmlns:a="http://schemas.openxmlformats.org/drawingml/2006/main" xmlns:r="http://schemas.openxmlformats.org/officeDocument/2006/relationships" xmlns:p="http://schemas.openxmlformats.org/presentationml/2006/main">
   <p:cSld>
     <p:spTree>
@@ -37498,7 +37936,7 @@
 </p:sld>
 </file>
 
-<file path=ppt/slides/slide3.xml><?xml version="1.0" encoding="utf-8"?>
+<file path=ppt/slides/slide4.xml><?xml version="1.0" encoding="utf-8"?>
 <p:sld xmlns:a="http://schemas.openxmlformats.org/drawingml/2006/main" xmlns:r="http://schemas.openxmlformats.org/officeDocument/2006/relationships" xmlns:p="http://schemas.openxmlformats.org/presentationml/2006/main">
   <p:cSld>
     <p:spTree>
@@ -37640,7 +38078,7 @@
 </p:sld>
 </file>
 
-<file path=ppt/slides/slide4.xml><?xml version="1.0" encoding="utf-8"?>
+<file path=ppt/slides/slide5.xml><?xml version="1.0" encoding="utf-8"?>
 <p:sld xmlns:a="http://schemas.openxmlformats.org/drawingml/2006/main" xmlns:r="http://schemas.openxmlformats.org/officeDocument/2006/relationships" xmlns:p="http://schemas.openxmlformats.org/presentationml/2006/main">
   <p:cSld>
     <p:spTree>
@@ -37708,7 +38146,7 @@
 </p:sld>
 </file>
 
-<file path=ppt/slides/slide5.xml><?xml version="1.0" encoding="utf-8"?>
+<file path=ppt/slides/slide6.xml><?xml version="1.0" encoding="utf-8"?>
 <p:sld xmlns:a="http://schemas.openxmlformats.org/drawingml/2006/main" xmlns:r="http://schemas.openxmlformats.org/officeDocument/2006/relationships" xmlns:p="http://schemas.openxmlformats.org/presentationml/2006/main">
   <p:cSld>
     <p:spTree>
@@ -37789,7 +38227,7 @@
 </p:sld>
 </file>
 
-<file path=ppt/slides/slide6.xml><?xml version="1.0" encoding="utf-8"?>
+<file path=ppt/slides/slide7.xml><?xml version="1.0" encoding="utf-8"?>
 <p:sld xmlns:a="http://schemas.openxmlformats.org/drawingml/2006/main" xmlns:r="http://schemas.openxmlformats.org/officeDocument/2006/relationships" xmlns:p="http://schemas.openxmlformats.org/presentationml/2006/main">
   <p:cSld>
     <p:spTree>
@@ -38029,7 +38467,7 @@
 </p:sld>
 </file>
 
-<file path=ppt/slides/slide7.xml><?xml version="1.0" encoding="utf-8"?>
+<file path=ppt/slides/slide8.xml><?xml version="1.0" encoding="utf-8"?>
 <p:sld xmlns:a="http://schemas.openxmlformats.org/drawingml/2006/main" xmlns:r="http://schemas.openxmlformats.org/officeDocument/2006/relationships" xmlns:p="http://schemas.openxmlformats.org/presentationml/2006/main">
   <p:cSld>
     <p:spTree>
@@ -38189,7 +38627,7 @@
 </p:sld>
 </file>
 
-<file path=ppt/slides/slide8.xml><?xml version="1.0" encoding="utf-8"?>
+<file path=ppt/slides/slide9.xml><?xml version="1.0" encoding="utf-8"?>
 <p:sld xmlns:a="http://schemas.openxmlformats.org/drawingml/2006/main" xmlns:r="http://schemas.openxmlformats.org/officeDocument/2006/relationships" xmlns:p="http://schemas.openxmlformats.org/presentationml/2006/main">
   <p:cSld>
     <p:spTree>
@@ -38464,266 +38902,6 @@
     <p:extLst>
       <p:ext uri="{BB962C8B-B14F-4D97-AF65-F5344CB8AC3E}">
         <p14:creationId xmlns:p14="http://schemas.microsoft.com/office/powerpoint/2010/main" val="876103952"/>
-      </p:ext>
-    </p:extLst>
-  </p:cSld>
-  <p:clrMapOvr>
-    <a:masterClrMapping/>
-  </p:clrMapOvr>
-  <p:transition>
-    <p:fade/>
-  </p:transition>
-</p:sld>
-</file>
-
-<file path=ppt/slides/slide9.xml><?xml version="1.0" encoding="utf-8"?>
-<p:sld xmlns:a="http://schemas.openxmlformats.org/drawingml/2006/main" xmlns:r="http://schemas.openxmlformats.org/officeDocument/2006/relationships" xmlns:p="http://schemas.openxmlformats.org/presentationml/2006/main">
-  <p:cSld>
-    <p:spTree>
-      <p:nvGrpSpPr>
-        <p:cNvPr id="1" name=""/>
-        <p:cNvGrpSpPr/>
-        <p:nvPr/>
-      </p:nvGrpSpPr>
-      <p:grpSpPr>
-        <a:xfrm>
-          <a:off x="0" y="0"/>
-          <a:ext cx="0" cy="0"/>
-          <a:chOff x="0" y="0"/>
-          <a:chExt cx="0" cy="0"/>
-        </a:xfrm>
-      </p:grpSpPr>
-      <p:sp>
-        <p:nvSpPr>
-          <p:cNvPr id="2" name="Title 1"/>
-          <p:cNvSpPr>
-            <a:spLocks noGrp="1"/>
-          </p:cNvSpPr>
-          <p:nvPr>
-            <p:ph type="title"/>
-          </p:nvPr>
-        </p:nvSpPr>
-        <p:spPr/>
-        <p:txBody>
-          <a:bodyPr/>
-          <a:lstStyle/>
-          <a:p>
-            <a:r>
-              <a:rPr lang="en-US" dirty="0"/>
-              <a:t>Answer</a:t>
-            </a:r>
-          </a:p>
-        </p:txBody>
-      </p:sp>
-      <p:sp>
-        <p:nvSpPr>
-          <p:cNvPr id="3" name="Content Placeholder 2"/>
-          <p:cNvSpPr>
-            <a:spLocks noGrp="1"/>
-          </p:cNvSpPr>
-          <p:nvPr>
-            <p:ph idx="1"/>
-          </p:nvPr>
-        </p:nvSpPr>
-        <p:spPr/>
-        <p:txBody>
-          <a:bodyPr anchor="ctr">
-            <a:normAutofit/>
-          </a:bodyPr>
-          <a:lstStyle/>
-          <a:p>
-            <a:pPr marL="57150" indent="0" algn="ctr">
-              <a:buNone/>
-            </a:pPr>
-            <a:r>
-              <a:rPr lang="en-US" sz="3200" dirty="0">
-                <a:solidFill>
-                  <a:srgbClr val="800000"/>
-                </a:solidFill>
-                <a:latin typeface="Consolas" panose="020B0609020204030204" pitchFamily="49" charset="0"/>
-              </a:rPr>
-              <a:t>&lt;button</a:t>
-            </a:r>
-            <a:r>
-              <a:rPr lang="en-US" sz="3200" dirty="0">
-                <a:solidFill>
-                  <a:srgbClr val="000000"/>
-                </a:solidFill>
-                <a:latin typeface="Consolas" panose="020B0609020204030204" pitchFamily="49" charset="0"/>
-              </a:rPr>
-              <a:t> </a:t>
-            </a:r>
-            <a:r>
-              <a:rPr lang="en-US" sz="3200" dirty="0" err="1">
-                <a:solidFill>
-                  <a:srgbClr val="FF0000"/>
-                </a:solidFill>
-                <a:latin typeface="Consolas" panose="020B0609020204030204" pitchFamily="49" charset="0"/>
-              </a:rPr>
-              <a:t>onclick</a:t>
-            </a:r>
-            <a:r>
-              <a:rPr lang="en-US" sz="3200" dirty="0">
-                <a:solidFill>
-                  <a:srgbClr val="000000"/>
-                </a:solidFill>
-                <a:latin typeface="Consolas" panose="020B0609020204030204" pitchFamily="49" charset="0"/>
-              </a:rPr>
-              <a:t>=</a:t>
-            </a:r>
-            <a:r>
-              <a:rPr lang="en-US" sz="3200" dirty="0">
-                <a:solidFill>
-                  <a:srgbClr val="0000FF"/>
-                </a:solidFill>
-                <a:latin typeface="Consolas" panose="020B0609020204030204" pitchFamily="49" charset="0"/>
-              </a:rPr>
-              <a:t>"</a:t>
-            </a:r>
-            <a:r>
-              <a:rPr lang="en-US" sz="3200" dirty="0" err="1">
-                <a:solidFill>
-                  <a:srgbClr val="0000FF"/>
-                </a:solidFill>
-                <a:latin typeface="Consolas" panose="020B0609020204030204" pitchFamily="49" charset="0"/>
-              </a:rPr>
-              <a:t>SendMessage</a:t>
-            </a:r>
-            <a:r>
-              <a:rPr lang="en-US" sz="3200" dirty="0">
-                <a:solidFill>
-                  <a:srgbClr val="0000FF"/>
-                </a:solidFill>
-                <a:latin typeface="Consolas" panose="020B0609020204030204" pitchFamily="49" charset="0"/>
-              </a:rPr>
-              <a:t>()"</a:t>
-            </a:r>
-            <a:r>
-              <a:rPr lang="en-US" sz="3200" dirty="0">
-                <a:solidFill>
-                  <a:srgbClr val="800000"/>
-                </a:solidFill>
-                <a:latin typeface="Consolas" panose="020B0609020204030204" pitchFamily="49" charset="0"/>
-              </a:rPr>
-              <a:t>&gt;</a:t>
-            </a:r>
-            <a:r>
-              <a:rPr lang="en-US" sz="3200" dirty="0">
-                <a:solidFill>
-                  <a:srgbClr val="000000"/>
-                </a:solidFill>
-                <a:latin typeface="Consolas" panose="020B0609020204030204" pitchFamily="49" charset="0"/>
-              </a:rPr>
-              <a:t>Click Me!</a:t>
-            </a:r>
-            <a:r>
-              <a:rPr lang="en-US" sz="3200" dirty="0">
-                <a:solidFill>
-                  <a:srgbClr val="800000"/>
-                </a:solidFill>
-                <a:latin typeface="Consolas" panose="020B0609020204030204" pitchFamily="49" charset="0"/>
-              </a:rPr>
-              <a:t>&lt;/button&gt;</a:t>
-            </a:r>
-          </a:p>
-          <a:p>
-            <a:pPr marL="57150" indent="0" algn="ctr">
-              <a:buNone/>
-            </a:pPr>
-            <a:endParaRPr lang="en-US" sz="3200" dirty="0">
-              <a:solidFill>
-                <a:srgbClr val="000000"/>
-              </a:solidFill>
-              <a:latin typeface="Consolas" panose="020B0609020204030204" pitchFamily="49" charset="0"/>
-            </a:endParaRPr>
-          </a:p>
-        </p:txBody>
-      </p:sp>
-      <p:sp>
-        <p:nvSpPr>
-          <p:cNvPr id="4" name="Rectangle 3"/>
-          <p:cNvSpPr/>
-          <p:nvPr/>
-        </p:nvSpPr>
-        <p:spPr bwMode="auto">
-          <a:xfrm>
-            <a:off x="2209800" y="2857500"/>
-            <a:ext cx="5257800" cy="1257300"/>
-          </a:xfrm>
-          <a:prstGeom prst="rect">
-            <a:avLst/>
-          </a:prstGeom>
-          <a:solidFill>
-            <a:schemeClr val="accent1">
-              <a:alpha val="27000"/>
-            </a:schemeClr>
-          </a:solidFill>
-          <a:ln w="31750">
-            <a:solidFill>
-              <a:schemeClr val="accent1"/>
-            </a:solidFill>
-            <a:miter lim="800000"/>
-            <a:headEnd type="none" w="med" len="med"/>
-            <a:tailEnd type="none" w="med" len="med"/>
-          </a:ln>
-          <a:effectLst/>
-        </p:spPr>
-        <p:style>
-          <a:lnRef idx="1">
-            <a:schemeClr val="accent2"/>
-          </a:lnRef>
-          <a:fillRef idx="3">
-            <a:schemeClr val="accent2"/>
-          </a:fillRef>
-          <a:effectRef idx="2">
-            <a:schemeClr val="accent2"/>
-          </a:effectRef>
-          <a:fontRef idx="minor">
-            <a:schemeClr val="lt1"/>
-          </a:fontRef>
-        </p:style>
-        <p:txBody>
-          <a:bodyPr rot="0" spcFirstLastPara="0" vertOverflow="overflow" horzOverflow="overflow" vert="horz" wrap="square" lIns="182880" tIns="146304" rIns="182880" bIns="146304" numCol="1" spcCol="0" rtlCol="0" fromWordArt="0" anchor="t" anchorCtr="0" forceAA="0" compatLnSpc="1">
-            <a:prstTxWarp prst="textNoShape">
-              <a:avLst/>
-            </a:prstTxWarp>
-            <a:noAutofit/>
-          </a:bodyPr>
-          <a:lstStyle/>
-          <a:p>
-            <a:pPr algn="ctr" defTabSz="932472" fontAlgn="base">
-              <a:lnSpc>
-                <a:spcPct val="90000"/>
-              </a:lnSpc>
-              <a:spcBef>
-                <a:spcPct val="0"/>
-              </a:spcBef>
-              <a:spcAft>
-                <a:spcPct val="0"/>
-              </a:spcAft>
-            </a:pPr>
-            <a:endParaRPr lang="en-US" sz="2400" dirty="0" err="1">
-              <a:gradFill>
-                <a:gsLst>
-                  <a:gs pos="0">
-                    <a:srgbClr val="FFFFFF"/>
-                  </a:gs>
-                  <a:gs pos="100000">
-                    <a:srgbClr val="FFFFFF"/>
-                  </a:gs>
-                </a:gsLst>
-                <a:lin ang="5400000" scaled="0"/>
-              </a:gradFill>
-              <a:ea typeface="Segoe UI" pitchFamily="34" charset="0"/>
-              <a:cs typeface="Segoe UI" pitchFamily="34" charset="0"/>
-            </a:endParaRPr>
-          </a:p>
-        </p:txBody>
-      </p:sp>
-    </p:spTree>
-    <p:extLst>
-      <p:ext uri="{BB962C8B-B14F-4D97-AF65-F5344CB8AC3E}">
-        <p14:creationId xmlns:p14="http://schemas.microsoft.com/office/powerpoint/2010/main" val="587035046"/>
       </p:ext>
     </p:extLst>
   </p:cSld>

</xml_diff>

<commit_message>
Update gitbook 2024-01-31 14:41:54
</commit_message>
<xml_diff>
--- a/Buttons/Review.pptx
+++ b/Buttons/Review.pptx
@@ -5,25 +5,26 @@
     <p:sldMasterId id="2147483648" r:id="rId1"/>
   </p:sldMasterIdLst>
   <p:notesMasterIdLst>
-    <p:notesMasterId r:id="rId18"/>
+    <p:notesMasterId r:id="rId19"/>
   </p:notesMasterIdLst>
   <p:sldIdLst>
     <p:sldId id="258" r:id="rId2"/>
-    <p:sldId id="307" r:id="rId3"/>
-    <p:sldId id="308" r:id="rId4"/>
-    <p:sldId id="309" r:id="rId5"/>
-    <p:sldId id="310" r:id="rId6"/>
-    <p:sldId id="311" r:id="rId7"/>
-    <p:sldId id="312" r:id="rId8"/>
-    <p:sldId id="313" r:id="rId9"/>
-    <p:sldId id="314" r:id="rId10"/>
-    <p:sldId id="315" r:id="rId11"/>
-    <p:sldId id="316" r:id="rId12"/>
-    <p:sldId id="320" r:id="rId13"/>
-    <p:sldId id="321" r:id="rId14"/>
-    <p:sldId id="317" r:id="rId15"/>
-    <p:sldId id="318" r:id="rId16"/>
-    <p:sldId id="319" r:id="rId17"/>
+    <p:sldId id="322" r:id="rId3"/>
+    <p:sldId id="307" r:id="rId4"/>
+    <p:sldId id="308" r:id="rId5"/>
+    <p:sldId id="309" r:id="rId6"/>
+    <p:sldId id="310" r:id="rId7"/>
+    <p:sldId id="311" r:id="rId8"/>
+    <p:sldId id="312" r:id="rId9"/>
+    <p:sldId id="313" r:id="rId10"/>
+    <p:sldId id="314" r:id="rId11"/>
+    <p:sldId id="315" r:id="rId12"/>
+    <p:sldId id="316" r:id="rId13"/>
+    <p:sldId id="320" r:id="rId14"/>
+    <p:sldId id="321" r:id="rId15"/>
+    <p:sldId id="317" r:id="rId16"/>
+    <p:sldId id="318" r:id="rId17"/>
+    <p:sldId id="319" r:id="rId18"/>
   </p:sldIdLst>
   <p:sldSz cx="12192000" cy="6858000"/>
   <p:notesSz cx="6858000" cy="9144000"/>
@@ -223,7 +224,7 @@
           <a:p>
             <a:fld id="{19104133-B5B0-4351-8158-4F0E5EB1E2BF}" type="datetimeFigureOut">
               <a:rPr lang="en-US" smtClean="0"/>
-              <a:t>9/6/2022</a:t>
+              <a:t>1/31/2024</a:t>
             </a:fld>
             <a:endParaRPr lang="en-US"/>
           </a:p>
@@ -566,7 +567,7 @@
           <a:p>
             <a:fld id="{DEC8F7F9-57EC-49CF-9FCD-2B781E4B449F}" type="slidenum">
               <a:rPr lang="en-US" smtClean="0"/>
-              <a:t>2</a:t>
+              <a:t>3</a:t>
             </a:fld>
             <a:endParaRPr lang="en-US"/>
           </a:p>
@@ -763,7 +764,7 @@
           <a:p>
             <a:fld id="{DEC8F7F9-57EC-49CF-9FCD-2B781E4B449F}" type="slidenum">
               <a:rPr lang="en-US" smtClean="0"/>
-              <a:t>9</a:t>
+              <a:t>10</a:t>
             </a:fld>
             <a:endParaRPr lang="en-US"/>
           </a:p>
@@ -847,7 +848,7 @@
           <a:p>
             <a:fld id="{DEC8F7F9-57EC-49CF-9FCD-2B781E4B449F}" type="slidenum">
               <a:rPr lang="en-US" smtClean="0"/>
-              <a:t>11</a:t>
+              <a:t>12</a:t>
             </a:fld>
             <a:endParaRPr lang="en-US"/>
           </a:p>
@@ -931,7 +932,7 @@
           <a:p>
             <a:fld id="{DEC8F7F9-57EC-49CF-9FCD-2B781E4B449F}" type="slidenum">
               <a:rPr lang="en-US" smtClean="0"/>
-              <a:t>13</a:t>
+              <a:t>14</a:t>
             </a:fld>
             <a:endParaRPr lang="en-US"/>
           </a:p>
@@ -1023,7 +1024,7 @@
           <a:p>
             <a:fld id="{DEC8F7F9-57EC-49CF-9FCD-2B781E4B449F}" type="slidenum">
               <a:rPr lang="en-US" smtClean="0"/>
-              <a:t>14</a:t>
+              <a:t>15</a:t>
             </a:fld>
             <a:endParaRPr lang="en-US"/>
           </a:p>
@@ -1224,7 +1225,7 @@
             <a:fld id="{1C2D31DE-C454-491C-B5C3-F097855E3DF7}" type="datetime4">
               <a:rPr lang="en-US" smtClean="0"/>
               <a:pPr/>
-              <a:t>September 6, 2022</a:t>
+              <a:t>January 31, 2024</a:t>
             </a:fld>
             <a:endParaRPr lang="en-US" dirty="0"/>
           </a:p>
@@ -4616,7 +4617,7 @@
           <a:p>
             <a:fld id="{5958763E-B898-436D-883D-03711491D54A}" type="datetimeFigureOut">
               <a:rPr lang="en-US" smtClean="0"/>
-              <a:t>9/6/2022</a:t>
+              <a:t>1/31/2024</a:t>
             </a:fld>
             <a:endParaRPr lang="en-US"/>
           </a:p>
@@ -4809,7 +4810,7 @@
           <a:p>
             <a:fld id="{5958763E-B898-436D-883D-03711491D54A}" type="datetimeFigureOut">
               <a:rPr lang="en-US" smtClean="0"/>
-              <a:t>9/6/2022</a:t>
+              <a:t>1/31/2024</a:t>
             </a:fld>
             <a:endParaRPr lang="en-US"/>
           </a:p>
@@ -5059,7 +5060,7 @@
           <a:p>
             <a:fld id="{5958763E-B898-436D-883D-03711491D54A}" type="datetimeFigureOut">
               <a:rPr lang="en-US" smtClean="0"/>
-              <a:t>9/6/2022</a:t>
+              <a:t>1/31/2024</a:t>
             </a:fld>
             <a:endParaRPr lang="en-US"/>
           </a:p>
@@ -5407,7 +5408,7 @@
           <a:p>
             <a:fld id="{5958763E-B898-436D-883D-03711491D54A}" type="datetimeFigureOut">
               <a:rPr lang="en-US" smtClean="0"/>
-              <a:t>9/6/2022</a:t>
+              <a:t>1/31/2024</a:t>
             </a:fld>
             <a:endParaRPr lang="en-US"/>
           </a:p>
@@ -5823,7 +5824,7 @@
           <a:p>
             <a:fld id="{5958763E-B898-436D-883D-03711491D54A}" type="datetimeFigureOut">
               <a:rPr lang="en-US" smtClean="0"/>
-              <a:t>9/6/2022</a:t>
+              <a:t>1/31/2024</a:t>
             </a:fld>
             <a:endParaRPr lang="en-US"/>
           </a:p>
@@ -6324,7 +6325,7 @@
           <a:p>
             <a:fld id="{5958763E-B898-436D-883D-03711491D54A}" type="datetimeFigureOut">
               <a:rPr lang="en-US" smtClean="0"/>
-              <a:t>9/6/2022</a:t>
+              <a:t>1/31/2024</a:t>
             </a:fld>
             <a:endParaRPr lang="en-US"/>
           </a:p>
@@ -6775,7 +6776,7 @@
           <a:p>
             <a:fld id="{5958763E-B898-436D-883D-03711491D54A}" type="datetimeFigureOut">
               <a:rPr lang="en-US" smtClean="0"/>
-              <a:t>9/6/2022</a:t>
+              <a:t>1/31/2024</a:t>
             </a:fld>
             <a:endParaRPr lang="en-US"/>
           </a:p>
@@ -7386,7 +7387,7 @@
           <a:p>
             <a:fld id="{5958763E-B898-436D-883D-03711491D54A}" type="datetimeFigureOut">
               <a:rPr lang="en-US" smtClean="0"/>
-              <a:t>9/6/2022</a:t>
+              <a:t>1/31/2024</a:t>
             </a:fld>
             <a:endParaRPr lang="en-US"/>
           </a:p>
@@ -8157,7 +8158,7 @@
           <a:p>
             <a:fld id="{5958763E-B898-436D-883D-03711491D54A}" type="datetimeFigureOut">
               <a:rPr lang="en-US" smtClean="0"/>
-              <a:t>9/6/2022</a:t>
+              <a:t>1/31/2024</a:t>
             </a:fld>
             <a:endParaRPr lang="en-US"/>
           </a:p>
@@ -8261,7 +8262,7 @@
           <a:p>
             <a:fld id="{5958763E-B898-436D-883D-03711491D54A}" type="datetimeFigureOut">
               <a:rPr lang="en-US" smtClean="0"/>
-              <a:t>9/6/2022</a:t>
+              <a:t>1/31/2024</a:t>
             </a:fld>
             <a:endParaRPr lang="en-US"/>
           </a:p>
@@ -8588,7 +8589,7 @@
             <a:fld id="{1C2D31DE-C454-491C-B5C3-F097855E3DF7}" type="datetime4">
               <a:rPr lang="en-US" smtClean="0"/>
               <a:pPr/>
-              <a:t>September 6, 2022</a:t>
+              <a:t>January 31, 2024</a:t>
             </a:fld>
             <a:endParaRPr lang="en-US" dirty="0"/>
           </a:p>
@@ -11740,7 +11741,7 @@
           <a:p>
             <a:fld id="{5958763E-B898-436D-883D-03711491D54A}" type="datetimeFigureOut">
               <a:rPr lang="en-US" smtClean="0"/>
-              <a:t>9/6/2022</a:t>
+              <a:t>1/31/2024</a:t>
             </a:fld>
             <a:endParaRPr lang="en-US"/>
           </a:p>
@@ -11864,7 +11865,7 @@
           <a:p>
             <a:fld id="{5958763E-B898-436D-883D-03711491D54A}" type="datetimeFigureOut">
               <a:rPr lang="en-US" smtClean="0"/>
-              <a:t>9/6/2022</a:t>
+              <a:t>1/31/2024</a:t>
             </a:fld>
             <a:endParaRPr lang="en-US"/>
           </a:p>
@@ -11988,7 +11989,7 @@
           <a:p>
             <a:fld id="{5958763E-B898-436D-883D-03711491D54A}" type="datetimeFigureOut">
               <a:rPr lang="en-US" smtClean="0"/>
-              <a:t>9/6/2022</a:t>
+              <a:t>1/31/2024</a:t>
             </a:fld>
             <a:endParaRPr lang="en-US"/>
           </a:p>
@@ -12112,7 +12113,7 @@
           <a:p>
             <a:fld id="{5958763E-B898-436D-883D-03711491D54A}" type="datetimeFigureOut">
               <a:rPr lang="en-US" smtClean="0"/>
-              <a:t>9/6/2022</a:t>
+              <a:t>1/31/2024</a:t>
             </a:fld>
             <a:endParaRPr lang="en-US"/>
           </a:p>
@@ -12236,7 +12237,7 @@
           <a:p>
             <a:fld id="{5958763E-B898-436D-883D-03711491D54A}" type="datetimeFigureOut">
               <a:rPr lang="en-US" smtClean="0"/>
-              <a:t>9/6/2022</a:t>
+              <a:t>1/31/2024</a:t>
             </a:fld>
             <a:endParaRPr lang="en-US"/>
           </a:p>
@@ -12360,7 +12361,7 @@
           <a:p>
             <a:fld id="{5958763E-B898-436D-883D-03711491D54A}" type="datetimeFigureOut">
               <a:rPr lang="en-US" smtClean="0"/>
-              <a:t>9/6/2022</a:t>
+              <a:t>1/31/2024</a:t>
             </a:fld>
             <a:endParaRPr lang="en-US"/>
           </a:p>
@@ -12484,7 +12485,7 @@
           <a:p>
             <a:fld id="{5958763E-B898-436D-883D-03711491D54A}" type="datetimeFigureOut">
               <a:rPr lang="en-US" smtClean="0"/>
-              <a:t>9/6/2022</a:t>
+              <a:t>1/31/2024</a:t>
             </a:fld>
             <a:endParaRPr lang="en-US"/>
           </a:p>
@@ -12608,7 +12609,7 @@
           <a:p>
             <a:fld id="{5958763E-B898-436D-883D-03711491D54A}" type="datetimeFigureOut">
               <a:rPr lang="en-US" smtClean="0"/>
-              <a:t>9/6/2022</a:t>
+              <a:t>1/31/2024</a:t>
             </a:fld>
             <a:endParaRPr lang="en-US"/>
           </a:p>
@@ -12741,7 +12742,7 @@
           <a:p>
             <a:fld id="{5958763E-B898-436D-883D-03711491D54A}" type="datetimeFigureOut">
               <a:rPr lang="en-US" smtClean="0"/>
-              <a:t>9/6/2022</a:t>
+              <a:t>1/31/2024</a:t>
             </a:fld>
             <a:endParaRPr lang="en-US"/>
           </a:p>
@@ -16080,7 +16081,7 @@
             <a:fld id="{1C2D31DE-C454-491C-B5C3-F097855E3DF7}" type="datetime4">
               <a:rPr lang="en-US" smtClean="0"/>
               <a:pPr/>
-              <a:t>September 6, 2022</a:t>
+              <a:t>January 31, 2024</a:t>
             </a:fld>
             <a:endParaRPr lang="en-US" dirty="0"/>
           </a:p>
@@ -28316,7 +28317,7 @@
           <a:p>
             <a:fld id="{5958763E-B898-436D-883D-03711491D54A}" type="datetimeFigureOut">
               <a:rPr lang="en-US" smtClean="0"/>
-              <a:t>9/6/2022</a:t>
+              <a:t>1/31/2024</a:t>
             </a:fld>
             <a:endParaRPr lang="en-US"/>
           </a:p>
@@ -28718,7 +28719,7 @@
           <a:p>
             <a:fld id="{5958763E-B898-436D-883D-03711491D54A}" type="datetimeFigureOut">
               <a:rPr lang="en-US" smtClean="0"/>
-              <a:t>9/6/2022</a:t>
+              <a:t>1/31/2024</a:t>
             </a:fld>
             <a:endParaRPr lang="en-US"/>
           </a:p>
@@ -29012,7 +29013,7 @@
           <a:p>
             <a:fld id="{5958763E-B898-436D-883D-03711491D54A}" type="datetimeFigureOut">
               <a:rPr lang="en-US" smtClean="0"/>
-              <a:t>9/6/2022</a:t>
+              <a:t>1/31/2024</a:t>
             </a:fld>
             <a:endParaRPr lang="en-US"/>
           </a:p>
@@ -29213,7 +29214,7 @@
           <a:p>
             <a:fld id="{5958763E-B898-436D-883D-03711491D54A}" type="datetimeFigureOut">
               <a:rPr lang="en-US" smtClean="0"/>
-              <a:t>9/6/2022</a:t>
+              <a:t>1/31/2024</a:t>
             </a:fld>
             <a:endParaRPr lang="en-US"/>
           </a:p>
@@ -29474,7 +29475,7 @@
           <a:p>
             <a:fld id="{5958763E-B898-436D-883D-03711491D54A}" type="datetimeFigureOut">
               <a:rPr lang="en-US" smtClean="0"/>
-              <a:t>9/6/2022</a:t>
+              <a:t>1/31/2024</a:t>
             </a:fld>
             <a:endParaRPr lang="en-US"/>
           </a:p>
@@ -29982,7 +29983,7 @@
           <a:p>
             <a:fld id="{5958763E-B898-436D-883D-03711491D54A}" type="datetimeFigureOut">
               <a:rPr lang="en-US" smtClean="0"/>
-              <a:t>9/6/2022</a:t>
+              <a:t>1/31/2024</a:t>
             </a:fld>
             <a:endParaRPr lang="en-US"/>
           </a:p>
@@ -30461,7 +30462,7 @@
           <a:p>
             <a:fld id="{5958763E-B898-436D-883D-03711491D54A}" type="datetimeFigureOut">
               <a:rPr lang="en-US" smtClean="0"/>
-              <a:t>9/6/2022</a:t>
+              <a:t>1/31/2024</a:t>
             </a:fld>
             <a:endParaRPr lang="en-US"/>
           </a:p>
@@ -31280,7 +31281,7 @@
           <a:p>
             <a:fld id="{5958763E-B898-436D-883D-03711491D54A}" type="datetimeFigureOut">
               <a:rPr lang="en-US" smtClean="0"/>
-              <a:t>9/6/2022</a:t>
+              <a:t>1/31/2024</a:t>
             </a:fld>
             <a:endParaRPr lang="en-US"/>
           </a:p>
@@ -31481,7 +31482,7 @@
           <a:p>
             <a:fld id="{5958763E-B898-436D-883D-03711491D54A}" type="datetimeFigureOut">
               <a:rPr lang="en-US" smtClean="0"/>
-              <a:t>9/6/2022</a:t>
+              <a:t>1/31/2024</a:t>
             </a:fld>
             <a:endParaRPr lang="en-US"/>
           </a:p>
@@ -31816,7 +31817,7 @@
           <a:p>
             <a:fld id="{5958763E-B898-436D-883D-03711491D54A}" type="datetimeFigureOut">
               <a:rPr lang="en-US" smtClean="0"/>
-              <a:t>9/6/2022</a:t>
+              <a:t>1/31/2024</a:t>
             </a:fld>
             <a:endParaRPr lang="en-US"/>
           </a:p>
@@ -32046,7 +32047,7 @@
           <a:p>
             <a:fld id="{5958763E-B898-436D-883D-03711491D54A}" type="datetimeFigureOut">
               <a:rPr lang="en-US" smtClean="0"/>
-              <a:t>9/6/2022</a:t>
+              <a:t>1/31/2024</a:t>
             </a:fld>
             <a:endParaRPr lang="en-US"/>
           </a:p>
@@ -32290,7 +32291,7 @@
           <a:p>
             <a:fld id="{5958763E-B898-436D-883D-03711491D54A}" type="datetimeFigureOut">
               <a:rPr lang="en-US" smtClean="0"/>
-              <a:t>9/6/2022</a:t>
+              <a:t>1/31/2024</a:t>
             </a:fld>
             <a:endParaRPr lang="en-US"/>
           </a:p>
@@ -35868,6 +35869,266 @@
             <p:ph type="title"/>
           </p:nvPr>
         </p:nvSpPr>
+        <p:spPr/>
+        <p:txBody>
+          <a:bodyPr/>
+          <a:lstStyle/>
+          <a:p>
+            <a:r>
+              <a:rPr lang="en-US" dirty="0"/>
+              <a:t>Answer</a:t>
+            </a:r>
+          </a:p>
+        </p:txBody>
+      </p:sp>
+      <p:sp>
+        <p:nvSpPr>
+          <p:cNvPr id="3" name="Content Placeholder 2"/>
+          <p:cNvSpPr>
+            <a:spLocks noGrp="1"/>
+          </p:cNvSpPr>
+          <p:nvPr>
+            <p:ph idx="1"/>
+          </p:nvPr>
+        </p:nvSpPr>
+        <p:spPr/>
+        <p:txBody>
+          <a:bodyPr anchor="ctr">
+            <a:normAutofit/>
+          </a:bodyPr>
+          <a:lstStyle/>
+          <a:p>
+            <a:pPr marL="57150" indent="0" algn="ctr">
+              <a:buNone/>
+            </a:pPr>
+            <a:r>
+              <a:rPr lang="en-US" sz="3200" dirty="0">
+                <a:solidFill>
+                  <a:srgbClr val="800000"/>
+                </a:solidFill>
+                <a:latin typeface="Consolas" panose="020B0609020204030204" pitchFamily="49" charset="0"/>
+              </a:rPr>
+              <a:t>&lt;button</a:t>
+            </a:r>
+            <a:r>
+              <a:rPr lang="en-US" sz="3200" dirty="0">
+                <a:solidFill>
+                  <a:srgbClr val="000000"/>
+                </a:solidFill>
+                <a:latin typeface="Consolas" panose="020B0609020204030204" pitchFamily="49" charset="0"/>
+              </a:rPr>
+              <a:t> </a:t>
+            </a:r>
+            <a:r>
+              <a:rPr lang="en-US" sz="3200" dirty="0" err="1">
+                <a:solidFill>
+                  <a:srgbClr val="FF0000"/>
+                </a:solidFill>
+                <a:latin typeface="Consolas" panose="020B0609020204030204" pitchFamily="49" charset="0"/>
+              </a:rPr>
+              <a:t>onclick</a:t>
+            </a:r>
+            <a:r>
+              <a:rPr lang="en-US" sz="3200" dirty="0">
+                <a:solidFill>
+                  <a:srgbClr val="000000"/>
+                </a:solidFill>
+                <a:latin typeface="Consolas" panose="020B0609020204030204" pitchFamily="49" charset="0"/>
+              </a:rPr>
+              <a:t>=</a:t>
+            </a:r>
+            <a:r>
+              <a:rPr lang="en-US" sz="3200" dirty="0">
+                <a:solidFill>
+                  <a:srgbClr val="0000FF"/>
+                </a:solidFill>
+                <a:latin typeface="Consolas" panose="020B0609020204030204" pitchFamily="49" charset="0"/>
+              </a:rPr>
+              <a:t>"</a:t>
+            </a:r>
+            <a:r>
+              <a:rPr lang="en-US" sz="3200" dirty="0" err="1">
+                <a:solidFill>
+                  <a:srgbClr val="0000FF"/>
+                </a:solidFill>
+                <a:latin typeface="Consolas" panose="020B0609020204030204" pitchFamily="49" charset="0"/>
+              </a:rPr>
+              <a:t>SendMessage</a:t>
+            </a:r>
+            <a:r>
+              <a:rPr lang="en-US" sz="3200" dirty="0">
+                <a:solidFill>
+                  <a:srgbClr val="0000FF"/>
+                </a:solidFill>
+                <a:latin typeface="Consolas" panose="020B0609020204030204" pitchFamily="49" charset="0"/>
+              </a:rPr>
+              <a:t>()"</a:t>
+            </a:r>
+            <a:r>
+              <a:rPr lang="en-US" sz="3200" dirty="0">
+                <a:solidFill>
+                  <a:srgbClr val="800000"/>
+                </a:solidFill>
+                <a:latin typeface="Consolas" panose="020B0609020204030204" pitchFamily="49" charset="0"/>
+              </a:rPr>
+              <a:t>&gt;</a:t>
+            </a:r>
+            <a:r>
+              <a:rPr lang="en-US" sz="3200" dirty="0">
+                <a:solidFill>
+                  <a:srgbClr val="000000"/>
+                </a:solidFill>
+                <a:latin typeface="Consolas" panose="020B0609020204030204" pitchFamily="49" charset="0"/>
+              </a:rPr>
+              <a:t>Click Me!</a:t>
+            </a:r>
+            <a:r>
+              <a:rPr lang="en-US" sz="3200" dirty="0">
+                <a:solidFill>
+                  <a:srgbClr val="800000"/>
+                </a:solidFill>
+                <a:latin typeface="Consolas" panose="020B0609020204030204" pitchFamily="49" charset="0"/>
+              </a:rPr>
+              <a:t>&lt;/button&gt;</a:t>
+            </a:r>
+          </a:p>
+          <a:p>
+            <a:pPr marL="57150" indent="0" algn="ctr">
+              <a:buNone/>
+            </a:pPr>
+            <a:endParaRPr lang="en-US" sz="3200" dirty="0">
+              <a:solidFill>
+                <a:srgbClr val="000000"/>
+              </a:solidFill>
+              <a:latin typeface="Consolas" panose="020B0609020204030204" pitchFamily="49" charset="0"/>
+            </a:endParaRPr>
+          </a:p>
+        </p:txBody>
+      </p:sp>
+      <p:sp>
+        <p:nvSpPr>
+          <p:cNvPr id="4" name="Rectangle 3"/>
+          <p:cNvSpPr/>
+          <p:nvPr/>
+        </p:nvSpPr>
+        <p:spPr bwMode="auto">
+          <a:xfrm>
+            <a:off x="2209800" y="2857500"/>
+            <a:ext cx="5257800" cy="1257300"/>
+          </a:xfrm>
+          <a:prstGeom prst="rect">
+            <a:avLst/>
+          </a:prstGeom>
+          <a:solidFill>
+            <a:schemeClr val="accent1">
+              <a:alpha val="27000"/>
+            </a:schemeClr>
+          </a:solidFill>
+          <a:ln w="31750">
+            <a:solidFill>
+              <a:schemeClr val="accent1"/>
+            </a:solidFill>
+            <a:miter lim="800000"/>
+            <a:headEnd type="none" w="med" len="med"/>
+            <a:tailEnd type="none" w="med" len="med"/>
+          </a:ln>
+          <a:effectLst/>
+        </p:spPr>
+        <p:style>
+          <a:lnRef idx="1">
+            <a:schemeClr val="accent2"/>
+          </a:lnRef>
+          <a:fillRef idx="3">
+            <a:schemeClr val="accent2"/>
+          </a:fillRef>
+          <a:effectRef idx="2">
+            <a:schemeClr val="accent2"/>
+          </a:effectRef>
+          <a:fontRef idx="minor">
+            <a:schemeClr val="lt1"/>
+          </a:fontRef>
+        </p:style>
+        <p:txBody>
+          <a:bodyPr rot="0" spcFirstLastPara="0" vertOverflow="overflow" horzOverflow="overflow" vert="horz" wrap="square" lIns="182880" tIns="146304" rIns="182880" bIns="146304" numCol="1" spcCol="0" rtlCol="0" fromWordArt="0" anchor="t" anchorCtr="0" forceAA="0" compatLnSpc="1">
+            <a:prstTxWarp prst="textNoShape">
+              <a:avLst/>
+            </a:prstTxWarp>
+            <a:noAutofit/>
+          </a:bodyPr>
+          <a:lstStyle/>
+          <a:p>
+            <a:pPr algn="ctr" defTabSz="932472" fontAlgn="base">
+              <a:lnSpc>
+                <a:spcPct val="90000"/>
+              </a:lnSpc>
+              <a:spcBef>
+                <a:spcPct val="0"/>
+              </a:spcBef>
+              <a:spcAft>
+                <a:spcPct val="0"/>
+              </a:spcAft>
+            </a:pPr>
+            <a:endParaRPr lang="en-US" sz="2400" dirty="0" err="1">
+              <a:gradFill>
+                <a:gsLst>
+                  <a:gs pos="0">
+                    <a:srgbClr val="FFFFFF"/>
+                  </a:gs>
+                  <a:gs pos="100000">
+                    <a:srgbClr val="FFFFFF"/>
+                  </a:gs>
+                </a:gsLst>
+                <a:lin ang="5400000" scaled="0"/>
+              </a:gradFill>
+              <a:ea typeface="Segoe UI" pitchFamily="34" charset="0"/>
+              <a:cs typeface="Segoe UI" pitchFamily="34" charset="0"/>
+            </a:endParaRPr>
+          </a:p>
+        </p:txBody>
+      </p:sp>
+    </p:spTree>
+    <p:extLst>
+      <p:ext uri="{BB962C8B-B14F-4D97-AF65-F5344CB8AC3E}">
+        <p14:creationId xmlns:p14="http://schemas.microsoft.com/office/powerpoint/2010/main" val="587035046"/>
+      </p:ext>
+    </p:extLst>
+  </p:cSld>
+  <p:clrMapOvr>
+    <a:masterClrMapping/>
+  </p:clrMapOvr>
+  <p:transition>
+    <p:fade/>
+  </p:transition>
+</p:sld>
+</file>
+
+<file path=ppt/slides/slide11.xml><?xml version="1.0" encoding="utf-8"?>
+<p:sld xmlns:a="http://schemas.openxmlformats.org/drawingml/2006/main" xmlns:r="http://schemas.openxmlformats.org/officeDocument/2006/relationships" xmlns:p="http://schemas.openxmlformats.org/presentationml/2006/main">
+  <p:cSld>
+    <p:spTree>
+      <p:nvGrpSpPr>
+        <p:cNvPr id="1" name=""/>
+        <p:cNvGrpSpPr/>
+        <p:nvPr/>
+      </p:nvGrpSpPr>
+      <p:grpSpPr>
+        <a:xfrm>
+          <a:off x="0" y="0"/>
+          <a:ext cx="0" cy="0"/>
+          <a:chOff x="0" y="0"/>
+          <a:chExt cx="0" cy="0"/>
+        </a:xfrm>
+      </p:grpSpPr>
+      <p:sp>
+        <p:nvSpPr>
+          <p:cNvPr id="2" name="Title 1"/>
+          <p:cNvSpPr>
+            <a:spLocks noGrp="1"/>
+          </p:cNvSpPr>
+          <p:nvPr>
+            <p:ph type="title"/>
+          </p:nvPr>
+        </p:nvSpPr>
         <p:spPr>
           <a:xfrm>
             <a:off x="381000" y="182880"/>
@@ -36167,7 +36428,7 @@
 </p:sld>
 </file>
 
-<file path=ppt/slides/slide11.xml><?xml version="1.0" encoding="utf-8"?>
+<file path=ppt/slides/slide12.xml><?xml version="1.0" encoding="utf-8"?>
 <p:sld xmlns:a="http://schemas.openxmlformats.org/drawingml/2006/main" xmlns:r="http://schemas.openxmlformats.org/officeDocument/2006/relationships" xmlns:p="http://schemas.openxmlformats.org/presentationml/2006/main">
   <p:cSld>
     <p:spTree>
@@ -36331,7 +36592,7 @@
 </p:sld>
 </file>
 
-<file path=ppt/slides/slide12.xml><?xml version="1.0" encoding="utf-8"?>
+<file path=ppt/slides/slide13.xml><?xml version="1.0" encoding="utf-8"?>
 <p:sld xmlns:a="http://schemas.openxmlformats.org/drawingml/2006/main" xmlns:r="http://schemas.openxmlformats.org/officeDocument/2006/relationships" xmlns:p="http://schemas.openxmlformats.org/presentationml/2006/main">
   <p:cSld>
     <p:spTree>
@@ -36517,7 +36778,7 @@
 </p:sld>
 </file>
 
-<file path=ppt/slides/slide13.xml><?xml version="1.0" encoding="utf-8"?>
+<file path=ppt/slides/slide14.xml><?xml version="1.0" encoding="utf-8"?>
 <p:sld xmlns:a="http://schemas.openxmlformats.org/drawingml/2006/main" xmlns:r="http://schemas.openxmlformats.org/officeDocument/2006/relationships" xmlns:p="http://schemas.openxmlformats.org/presentationml/2006/main">
   <p:cSld>
     <p:spTree>
@@ -36671,7 +36932,7 @@
 </p:sld>
 </file>
 
-<file path=ppt/slides/slide14.xml><?xml version="1.0" encoding="utf-8"?>
+<file path=ppt/slides/slide15.xml><?xml version="1.0" encoding="utf-8"?>
 <p:sld xmlns:a="http://schemas.openxmlformats.org/drawingml/2006/main" xmlns:r="http://schemas.openxmlformats.org/officeDocument/2006/relationships" xmlns:p="http://schemas.openxmlformats.org/presentationml/2006/main">
   <p:cSld>
     <p:spTree>
@@ -36731,7 +36992,7 @@
 </p:sld>
 </file>
 
-<file path=ppt/slides/slide15.xml><?xml version="1.0" encoding="utf-8"?>
+<file path=ppt/slides/slide16.xml><?xml version="1.0" encoding="utf-8"?>
 <p:sld xmlns:a="http://schemas.openxmlformats.org/drawingml/2006/main" xmlns:r="http://schemas.openxmlformats.org/officeDocument/2006/relationships" xmlns:p="http://schemas.openxmlformats.org/presentationml/2006/main">
   <p:cSld>
     <p:spTree>
@@ -37177,7 +37438,7 @@
 </p:sld>
 </file>
 
-<file path=ppt/slides/slide16.xml><?xml version="1.0" encoding="utf-8"?>
+<file path=ppt/slides/slide17.xml><?xml version="1.0" encoding="utf-8"?>
 <p:sld xmlns:a="http://schemas.openxmlformats.org/drawingml/2006/main" xmlns:r="http://schemas.openxmlformats.org/officeDocument/2006/relationships" xmlns:p="http://schemas.openxmlformats.org/presentationml/2006/main">
   <p:cSld>
     <p:spTree>
@@ -37264,6 +37525,183 @@
 </file>
 
 <file path=ppt/slides/slide2.xml><?xml version="1.0" encoding="utf-8"?>
+<p:sld xmlns:a="http://schemas.openxmlformats.org/drawingml/2006/main" xmlns:r="http://schemas.openxmlformats.org/officeDocument/2006/relationships" xmlns:p="http://schemas.openxmlformats.org/presentationml/2006/main">
+  <p:cSld>
+    <p:spTree>
+      <p:nvGrpSpPr>
+        <p:cNvPr id="1" name=""/>
+        <p:cNvGrpSpPr/>
+        <p:nvPr/>
+      </p:nvGrpSpPr>
+      <p:grpSpPr>
+        <a:xfrm>
+          <a:off x="0" y="0"/>
+          <a:ext cx="0" cy="0"/>
+          <a:chOff x="0" y="0"/>
+          <a:chExt cx="0" cy="0"/>
+        </a:xfrm>
+      </p:grpSpPr>
+      <p:sp>
+        <p:nvSpPr>
+          <p:cNvPr id="2" name="Title 1">
+            <a:extLst>
+              <a:ext uri="{FF2B5EF4-FFF2-40B4-BE49-F238E27FC236}">
+                <a16:creationId xmlns:a16="http://schemas.microsoft.com/office/drawing/2014/main" id="{B3A6B399-C57C-7300-8C2B-E3261157A6CF}"/>
+              </a:ext>
+            </a:extLst>
+          </p:cNvPr>
+          <p:cNvSpPr>
+            <a:spLocks noGrp="1"/>
+          </p:cNvSpPr>
+          <p:nvPr>
+            <p:ph type="title"/>
+          </p:nvPr>
+        </p:nvSpPr>
+        <p:spPr/>
+        <p:txBody>
+          <a:bodyPr/>
+          <a:lstStyle/>
+          <a:p>
+            <a:r>
+              <a:rPr lang="en-US" dirty="0"/>
+              <a:t>TEAMS</a:t>
+            </a:r>
+          </a:p>
+        </p:txBody>
+      </p:sp>
+      <p:sp>
+        <p:nvSpPr>
+          <p:cNvPr id="3" name="Content Placeholder 2">
+            <a:extLst>
+              <a:ext uri="{FF2B5EF4-FFF2-40B4-BE49-F238E27FC236}">
+                <a16:creationId xmlns:a16="http://schemas.microsoft.com/office/drawing/2014/main" id="{7BBBC54D-5C08-40B0-64EA-F2598CF983C1}"/>
+              </a:ext>
+            </a:extLst>
+          </p:cNvPr>
+          <p:cNvSpPr>
+            <a:spLocks noGrp="1"/>
+          </p:cNvSpPr>
+          <p:nvPr>
+            <p:ph idx="1"/>
+          </p:nvPr>
+        </p:nvSpPr>
+        <p:spPr/>
+        <p:txBody>
+          <a:bodyPr/>
+          <a:lstStyle/>
+          <a:p>
+            <a:pPr marL="57150" indent="0">
+              <a:buNone/>
+            </a:pPr>
+            <a:r>
+              <a:rPr lang="en-US" b="1" dirty="0"/>
+              <a:t>Team 1: </a:t>
+            </a:r>
+            <a:r>
+              <a:rPr lang="en-US" b="1" dirty="0">
+                <a:hlinkClick r:id="rId2"/>
+              </a:rPr>
+              <a:t>https://replit.com/join/iacmabopuy-hylandoutreach</a:t>
+            </a:r>
+            <a:endParaRPr lang="en-US" b="1" dirty="0"/>
+          </a:p>
+          <a:p>
+            <a:pPr marL="57150" indent="0">
+              <a:buNone/>
+            </a:pPr>
+            <a:r>
+              <a:rPr lang="en-US" dirty="0"/>
+              <a:t>Name, Name, Name, Name</a:t>
+            </a:r>
+          </a:p>
+          <a:p>
+            <a:pPr marL="57150" indent="0">
+              <a:buNone/>
+            </a:pPr>
+            <a:endParaRPr lang="en-US" dirty="0"/>
+          </a:p>
+          <a:p>
+            <a:pPr marL="57150" indent="0">
+              <a:buNone/>
+            </a:pPr>
+            <a:r>
+              <a:rPr lang="en-US" b="1" dirty="0"/>
+              <a:t>Team 2: </a:t>
+            </a:r>
+            <a:r>
+              <a:rPr lang="en-US" b="1" dirty="0">
+                <a:hlinkClick r:id="rId3"/>
+              </a:rPr>
+              <a:t>https://replit.com/join/unymmgzsgy-hylandoutreach</a:t>
+            </a:r>
+            <a:endParaRPr lang="en-US" b="1" dirty="0"/>
+          </a:p>
+          <a:p>
+            <a:pPr marL="57150" indent="0">
+              <a:buNone/>
+            </a:pPr>
+            <a:r>
+              <a:rPr lang="en-US" dirty="0"/>
+              <a:t>Name, Name, Name, Name</a:t>
+            </a:r>
+          </a:p>
+          <a:p>
+            <a:pPr marL="57150" indent="0">
+              <a:buNone/>
+            </a:pPr>
+            <a:endParaRPr lang="en-US" dirty="0"/>
+          </a:p>
+          <a:p>
+            <a:pPr marL="57150" indent="0">
+              <a:buNone/>
+            </a:pPr>
+            <a:r>
+              <a:rPr lang="en-US" b="1" dirty="0"/>
+              <a:t>Team 3: </a:t>
+            </a:r>
+            <a:r>
+              <a:rPr lang="en-US" b="1" dirty="0">
+                <a:hlinkClick r:id="rId4"/>
+              </a:rPr>
+              <a:t>https://replit.com/join/tlxrtqvqmf-hylandoutreach</a:t>
+            </a:r>
+            <a:endParaRPr lang="en-US" b="1" dirty="0"/>
+          </a:p>
+          <a:p>
+            <a:pPr marL="57150" indent="0">
+              <a:buNone/>
+            </a:pPr>
+            <a:r>
+              <a:rPr lang="en-US"/>
+              <a:t>Name, Name, Name, Name</a:t>
+            </a:r>
+            <a:endParaRPr lang="en-US" dirty="0"/>
+          </a:p>
+          <a:p>
+            <a:pPr marL="57150" indent="0">
+              <a:buNone/>
+            </a:pPr>
+            <a:endParaRPr lang="en-US" dirty="0"/>
+          </a:p>
+        </p:txBody>
+      </p:sp>
+    </p:spTree>
+    <p:extLst>
+      <p:ext uri="{BB962C8B-B14F-4D97-AF65-F5344CB8AC3E}">
+        <p14:creationId xmlns:p14="http://schemas.microsoft.com/office/powerpoint/2010/main" val="2581119752"/>
+      </p:ext>
+    </p:extLst>
+  </p:cSld>
+  <p:clrMapOvr>
+    <a:masterClrMapping/>
+  </p:clrMapOvr>
+  <p:transition>
+    <p:fade/>
+  </p:transition>
+</p:sld>
+</file>
+
+<file path=ppt/slides/slide3.xml><?xml version="1.0" encoding="utf-8"?>
 <p:sld xmlns:a="http://schemas.openxmlformats.org/drawingml/2006/main" xmlns:r="http://schemas.openxmlformats.org/officeDocument/2006/relationships" xmlns:p="http://schemas.openxmlformats.org/presentationml/2006/main">
   <p:cSld>
     <p:spTree>
@@ -37498,7 +37936,7 @@
 </p:sld>
 </file>
 
-<file path=ppt/slides/slide3.xml><?xml version="1.0" encoding="utf-8"?>
+<file path=ppt/slides/slide4.xml><?xml version="1.0" encoding="utf-8"?>
 <p:sld xmlns:a="http://schemas.openxmlformats.org/drawingml/2006/main" xmlns:r="http://schemas.openxmlformats.org/officeDocument/2006/relationships" xmlns:p="http://schemas.openxmlformats.org/presentationml/2006/main">
   <p:cSld>
     <p:spTree>
@@ -37640,7 +38078,7 @@
 </p:sld>
 </file>
 
-<file path=ppt/slides/slide4.xml><?xml version="1.0" encoding="utf-8"?>
+<file path=ppt/slides/slide5.xml><?xml version="1.0" encoding="utf-8"?>
 <p:sld xmlns:a="http://schemas.openxmlformats.org/drawingml/2006/main" xmlns:r="http://schemas.openxmlformats.org/officeDocument/2006/relationships" xmlns:p="http://schemas.openxmlformats.org/presentationml/2006/main">
   <p:cSld>
     <p:spTree>
@@ -37708,7 +38146,7 @@
 </p:sld>
 </file>
 
-<file path=ppt/slides/slide5.xml><?xml version="1.0" encoding="utf-8"?>
+<file path=ppt/slides/slide6.xml><?xml version="1.0" encoding="utf-8"?>
 <p:sld xmlns:a="http://schemas.openxmlformats.org/drawingml/2006/main" xmlns:r="http://schemas.openxmlformats.org/officeDocument/2006/relationships" xmlns:p="http://schemas.openxmlformats.org/presentationml/2006/main">
   <p:cSld>
     <p:spTree>
@@ -37789,7 +38227,7 @@
 </p:sld>
 </file>
 
-<file path=ppt/slides/slide6.xml><?xml version="1.0" encoding="utf-8"?>
+<file path=ppt/slides/slide7.xml><?xml version="1.0" encoding="utf-8"?>
 <p:sld xmlns:a="http://schemas.openxmlformats.org/drawingml/2006/main" xmlns:r="http://schemas.openxmlformats.org/officeDocument/2006/relationships" xmlns:p="http://schemas.openxmlformats.org/presentationml/2006/main">
   <p:cSld>
     <p:spTree>
@@ -38029,7 +38467,7 @@
 </p:sld>
 </file>
 
-<file path=ppt/slides/slide7.xml><?xml version="1.0" encoding="utf-8"?>
+<file path=ppt/slides/slide8.xml><?xml version="1.0" encoding="utf-8"?>
 <p:sld xmlns:a="http://schemas.openxmlformats.org/drawingml/2006/main" xmlns:r="http://schemas.openxmlformats.org/officeDocument/2006/relationships" xmlns:p="http://schemas.openxmlformats.org/presentationml/2006/main">
   <p:cSld>
     <p:spTree>
@@ -38189,7 +38627,7 @@
 </p:sld>
 </file>
 
-<file path=ppt/slides/slide8.xml><?xml version="1.0" encoding="utf-8"?>
+<file path=ppt/slides/slide9.xml><?xml version="1.0" encoding="utf-8"?>
 <p:sld xmlns:a="http://schemas.openxmlformats.org/drawingml/2006/main" xmlns:r="http://schemas.openxmlformats.org/officeDocument/2006/relationships" xmlns:p="http://schemas.openxmlformats.org/presentationml/2006/main">
   <p:cSld>
     <p:spTree>
@@ -38464,266 +38902,6 @@
     <p:extLst>
       <p:ext uri="{BB962C8B-B14F-4D97-AF65-F5344CB8AC3E}">
         <p14:creationId xmlns:p14="http://schemas.microsoft.com/office/powerpoint/2010/main" val="876103952"/>
-      </p:ext>
-    </p:extLst>
-  </p:cSld>
-  <p:clrMapOvr>
-    <a:masterClrMapping/>
-  </p:clrMapOvr>
-  <p:transition>
-    <p:fade/>
-  </p:transition>
-</p:sld>
-</file>
-
-<file path=ppt/slides/slide9.xml><?xml version="1.0" encoding="utf-8"?>
-<p:sld xmlns:a="http://schemas.openxmlformats.org/drawingml/2006/main" xmlns:r="http://schemas.openxmlformats.org/officeDocument/2006/relationships" xmlns:p="http://schemas.openxmlformats.org/presentationml/2006/main">
-  <p:cSld>
-    <p:spTree>
-      <p:nvGrpSpPr>
-        <p:cNvPr id="1" name=""/>
-        <p:cNvGrpSpPr/>
-        <p:nvPr/>
-      </p:nvGrpSpPr>
-      <p:grpSpPr>
-        <a:xfrm>
-          <a:off x="0" y="0"/>
-          <a:ext cx="0" cy="0"/>
-          <a:chOff x="0" y="0"/>
-          <a:chExt cx="0" cy="0"/>
-        </a:xfrm>
-      </p:grpSpPr>
-      <p:sp>
-        <p:nvSpPr>
-          <p:cNvPr id="2" name="Title 1"/>
-          <p:cNvSpPr>
-            <a:spLocks noGrp="1"/>
-          </p:cNvSpPr>
-          <p:nvPr>
-            <p:ph type="title"/>
-          </p:nvPr>
-        </p:nvSpPr>
-        <p:spPr/>
-        <p:txBody>
-          <a:bodyPr/>
-          <a:lstStyle/>
-          <a:p>
-            <a:r>
-              <a:rPr lang="en-US" dirty="0"/>
-              <a:t>Answer</a:t>
-            </a:r>
-          </a:p>
-        </p:txBody>
-      </p:sp>
-      <p:sp>
-        <p:nvSpPr>
-          <p:cNvPr id="3" name="Content Placeholder 2"/>
-          <p:cNvSpPr>
-            <a:spLocks noGrp="1"/>
-          </p:cNvSpPr>
-          <p:nvPr>
-            <p:ph idx="1"/>
-          </p:nvPr>
-        </p:nvSpPr>
-        <p:spPr/>
-        <p:txBody>
-          <a:bodyPr anchor="ctr">
-            <a:normAutofit/>
-          </a:bodyPr>
-          <a:lstStyle/>
-          <a:p>
-            <a:pPr marL="57150" indent="0" algn="ctr">
-              <a:buNone/>
-            </a:pPr>
-            <a:r>
-              <a:rPr lang="en-US" sz="3200" dirty="0">
-                <a:solidFill>
-                  <a:srgbClr val="800000"/>
-                </a:solidFill>
-                <a:latin typeface="Consolas" panose="020B0609020204030204" pitchFamily="49" charset="0"/>
-              </a:rPr>
-              <a:t>&lt;button</a:t>
-            </a:r>
-            <a:r>
-              <a:rPr lang="en-US" sz="3200" dirty="0">
-                <a:solidFill>
-                  <a:srgbClr val="000000"/>
-                </a:solidFill>
-                <a:latin typeface="Consolas" panose="020B0609020204030204" pitchFamily="49" charset="0"/>
-              </a:rPr>
-              <a:t> </a:t>
-            </a:r>
-            <a:r>
-              <a:rPr lang="en-US" sz="3200" dirty="0" err="1">
-                <a:solidFill>
-                  <a:srgbClr val="FF0000"/>
-                </a:solidFill>
-                <a:latin typeface="Consolas" panose="020B0609020204030204" pitchFamily="49" charset="0"/>
-              </a:rPr>
-              <a:t>onclick</a:t>
-            </a:r>
-            <a:r>
-              <a:rPr lang="en-US" sz="3200" dirty="0">
-                <a:solidFill>
-                  <a:srgbClr val="000000"/>
-                </a:solidFill>
-                <a:latin typeface="Consolas" panose="020B0609020204030204" pitchFamily="49" charset="0"/>
-              </a:rPr>
-              <a:t>=</a:t>
-            </a:r>
-            <a:r>
-              <a:rPr lang="en-US" sz="3200" dirty="0">
-                <a:solidFill>
-                  <a:srgbClr val="0000FF"/>
-                </a:solidFill>
-                <a:latin typeface="Consolas" panose="020B0609020204030204" pitchFamily="49" charset="0"/>
-              </a:rPr>
-              <a:t>"</a:t>
-            </a:r>
-            <a:r>
-              <a:rPr lang="en-US" sz="3200" dirty="0" err="1">
-                <a:solidFill>
-                  <a:srgbClr val="0000FF"/>
-                </a:solidFill>
-                <a:latin typeface="Consolas" panose="020B0609020204030204" pitchFamily="49" charset="0"/>
-              </a:rPr>
-              <a:t>SendMessage</a:t>
-            </a:r>
-            <a:r>
-              <a:rPr lang="en-US" sz="3200" dirty="0">
-                <a:solidFill>
-                  <a:srgbClr val="0000FF"/>
-                </a:solidFill>
-                <a:latin typeface="Consolas" panose="020B0609020204030204" pitchFamily="49" charset="0"/>
-              </a:rPr>
-              <a:t>()"</a:t>
-            </a:r>
-            <a:r>
-              <a:rPr lang="en-US" sz="3200" dirty="0">
-                <a:solidFill>
-                  <a:srgbClr val="800000"/>
-                </a:solidFill>
-                <a:latin typeface="Consolas" panose="020B0609020204030204" pitchFamily="49" charset="0"/>
-              </a:rPr>
-              <a:t>&gt;</a:t>
-            </a:r>
-            <a:r>
-              <a:rPr lang="en-US" sz="3200" dirty="0">
-                <a:solidFill>
-                  <a:srgbClr val="000000"/>
-                </a:solidFill>
-                <a:latin typeface="Consolas" panose="020B0609020204030204" pitchFamily="49" charset="0"/>
-              </a:rPr>
-              <a:t>Click Me!</a:t>
-            </a:r>
-            <a:r>
-              <a:rPr lang="en-US" sz="3200" dirty="0">
-                <a:solidFill>
-                  <a:srgbClr val="800000"/>
-                </a:solidFill>
-                <a:latin typeface="Consolas" panose="020B0609020204030204" pitchFamily="49" charset="0"/>
-              </a:rPr>
-              <a:t>&lt;/button&gt;</a:t>
-            </a:r>
-          </a:p>
-          <a:p>
-            <a:pPr marL="57150" indent="0" algn="ctr">
-              <a:buNone/>
-            </a:pPr>
-            <a:endParaRPr lang="en-US" sz="3200" dirty="0">
-              <a:solidFill>
-                <a:srgbClr val="000000"/>
-              </a:solidFill>
-              <a:latin typeface="Consolas" panose="020B0609020204030204" pitchFamily="49" charset="0"/>
-            </a:endParaRPr>
-          </a:p>
-        </p:txBody>
-      </p:sp>
-      <p:sp>
-        <p:nvSpPr>
-          <p:cNvPr id="4" name="Rectangle 3"/>
-          <p:cNvSpPr/>
-          <p:nvPr/>
-        </p:nvSpPr>
-        <p:spPr bwMode="auto">
-          <a:xfrm>
-            <a:off x="2209800" y="2857500"/>
-            <a:ext cx="5257800" cy="1257300"/>
-          </a:xfrm>
-          <a:prstGeom prst="rect">
-            <a:avLst/>
-          </a:prstGeom>
-          <a:solidFill>
-            <a:schemeClr val="accent1">
-              <a:alpha val="27000"/>
-            </a:schemeClr>
-          </a:solidFill>
-          <a:ln w="31750">
-            <a:solidFill>
-              <a:schemeClr val="accent1"/>
-            </a:solidFill>
-            <a:miter lim="800000"/>
-            <a:headEnd type="none" w="med" len="med"/>
-            <a:tailEnd type="none" w="med" len="med"/>
-          </a:ln>
-          <a:effectLst/>
-        </p:spPr>
-        <p:style>
-          <a:lnRef idx="1">
-            <a:schemeClr val="accent2"/>
-          </a:lnRef>
-          <a:fillRef idx="3">
-            <a:schemeClr val="accent2"/>
-          </a:fillRef>
-          <a:effectRef idx="2">
-            <a:schemeClr val="accent2"/>
-          </a:effectRef>
-          <a:fontRef idx="minor">
-            <a:schemeClr val="lt1"/>
-          </a:fontRef>
-        </p:style>
-        <p:txBody>
-          <a:bodyPr rot="0" spcFirstLastPara="0" vertOverflow="overflow" horzOverflow="overflow" vert="horz" wrap="square" lIns="182880" tIns="146304" rIns="182880" bIns="146304" numCol="1" spcCol="0" rtlCol="0" fromWordArt="0" anchor="t" anchorCtr="0" forceAA="0" compatLnSpc="1">
-            <a:prstTxWarp prst="textNoShape">
-              <a:avLst/>
-            </a:prstTxWarp>
-            <a:noAutofit/>
-          </a:bodyPr>
-          <a:lstStyle/>
-          <a:p>
-            <a:pPr algn="ctr" defTabSz="932472" fontAlgn="base">
-              <a:lnSpc>
-                <a:spcPct val="90000"/>
-              </a:lnSpc>
-              <a:spcBef>
-                <a:spcPct val="0"/>
-              </a:spcBef>
-              <a:spcAft>
-                <a:spcPct val="0"/>
-              </a:spcAft>
-            </a:pPr>
-            <a:endParaRPr lang="en-US" sz="2400" dirty="0" err="1">
-              <a:gradFill>
-                <a:gsLst>
-                  <a:gs pos="0">
-                    <a:srgbClr val="FFFFFF"/>
-                  </a:gs>
-                  <a:gs pos="100000">
-                    <a:srgbClr val="FFFFFF"/>
-                  </a:gs>
-                </a:gsLst>
-                <a:lin ang="5400000" scaled="0"/>
-              </a:gradFill>
-              <a:ea typeface="Segoe UI" pitchFamily="34" charset="0"/>
-              <a:cs typeface="Segoe UI" pitchFamily="34" charset="0"/>
-            </a:endParaRPr>
-          </a:p>
-        </p:txBody>
-      </p:sp>
-    </p:spTree>
-    <p:extLst>
-      <p:ext uri="{BB962C8B-B14F-4D97-AF65-F5344CB8AC3E}">
-        <p14:creationId xmlns:p14="http://schemas.microsoft.com/office/powerpoint/2010/main" val="587035046"/>
       </p:ext>
     </p:extLst>
   </p:cSld>

</xml_diff>

<commit_message>
update review ppt w4
</commit_message>
<xml_diff>
--- a/Buttons/Review.pptx
+++ b/Buttons/Review.pptx
@@ -224,7 +224,7 @@
           <a:p>
             <a:fld id="{19104133-B5B0-4351-8158-4F0E5EB1E2BF}" type="datetimeFigureOut">
               <a:rPr lang="en-US" smtClean="0"/>
-              <a:t>1/31/2024</a:t>
+              <a:t>3/12/2024</a:t>
             </a:fld>
             <a:endParaRPr lang="en-US"/>
           </a:p>
@@ -1225,7 +1225,7 @@
             <a:fld id="{1C2D31DE-C454-491C-B5C3-F097855E3DF7}" type="datetime4">
               <a:rPr lang="en-US" smtClean="0"/>
               <a:pPr/>
-              <a:t>January 31, 2024</a:t>
+              <a:t>March 12, 2024</a:t>
             </a:fld>
             <a:endParaRPr lang="en-US" dirty="0"/>
           </a:p>
@@ -4617,7 +4617,7 @@
           <a:p>
             <a:fld id="{5958763E-B898-436D-883D-03711491D54A}" type="datetimeFigureOut">
               <a:rPr lang="en-US" smtClean="0"/>
-              <a:t>1/31/2024</a:t>
+              <a:t>3/12/2024</a:t>
             </a:fld>
             <a:endParaRPr lang="en-US"/>
           </a:p>
@@ -4810,7 +4810,7 @@
           <a:p>
             <a:fld id="{5958763E-B898-436D-883D-03711491D54A}" type="datetimeFigureOut">
               <a:rPr lang="en-US" smtClean="0"/>
-              <a:t>1/31/2024</a:t>
+              <a:t>3/12/2024</a:t>
             </a:fld>
             <a:endParaRPr lang="en-US"/>
           </a:p>
@@ -5060,7 +5060,7 @@
           <a:p>
             <a:fld id="{5958763E-B898-436D-883D-03711491D54A}" type="datetimeFigureOut">
               <a:rPr lang="en-US" smtClean="0"/>
-              <a:t>1/31/2024</a:t>
+              <a:t>3/12/2024</a:t>
             </a:fld>
             <a:endParaRPr lang="en-US"/>
           </a:p>
@@ -5408,7 +5408,7 @@
           <a:p>
             <a:fld id="{5958763E-B898-436D-883D-03711491D54A}" type="datetimeFigureOut">
               <a:rPr lang="en-US" smtClean="0"/>
-              <a:t>1/31/2024</a:t>
+              <a:t>3/12/2024</a:t>
             </a:fld>
             <a:endParaRPr lang="en-US"/>
           </a:p>
@@ -5824,7 +5824,7 @@
           <a:p>
             <a:fld id="{5958763E-B898-436D-883D-03711491D54A}" type="datetimeFigureOut">
               <a:rPr lang="en-US" smtClean="0"/>
-              <a:t>1/31/2024</a:t>
+              <a:t>3/12/2024</a:t>
             </a:fld>
             <a:endParaRPr lang="en-US"/>
           </a:p>
@@ -6325,7 +6325,7 @@
           <a:p>
             <a:fld id="{5958763E-B898-436D-883D-03711491D54A}" type="datetimeFigureOut">
               <a:rPr lang="en-US" smtClean="0"/>
-              <a:t>1/31/2024</a:t>
+              <a:t>3/12/2024</a:t>
             </a:fld>
             <a:endParaRPr lang="en-US"/>
           </a:p>
@@ -6776,7 +6776,7 @@
           <a:p>
             <a:fld id="{5958763E-B898-436D-883D-03711491D54A}" type="datetimeFigureOut">
               <a:rPr lang="en-US" smtClean="0"/>
-              <a:t>1/31/2024</a:t>
+              <a:t>3/12/2024</a:t>
             </a:fld>
             <a:endParaRPr lang="en-US"/>
           </a:p>
@@ -7387,7 +7387,7 @@
           <a:p>
             <a:fld id="{5958763E-B898-436D-883D-03711491D54A}" type="datetimeFigureOut">
               <a:rPr lang="en-US" smtClean="0"/>
-              <a:t>1/31/2024</a:t>
+              <a:t>3/12/2024</a:t>
             </a:fld>
             <a:endParaRPr lang="en-US"/>
           </a:p>
@@ -8158,7 +8158,7 @@
           <a:p>
             <a:fld id="{5958763E-B898-436D-883D-03711491D54A}" type="datetimeFigureOut">
               <a:rPr lang="en-US" smtClean="0"/>
-              <a:t>1/31/2024</a:t>
+              <a:t>3/12/2024</a:t>
             </a:fld>
             <a:endParaRPr lang="en-US"/>
           </a:p>
@@ -8262,7 +8262,7 @@
           <a:p>
             <a:fld id="{5958763E-B898-436D-883D-03711491D54A}" type="datetimeFigureOut">
               <a:rPr lang="en-US" smtClean="0"/>
-              <a:t>1/31/2024</a:t>
+              <a:t>3/12/2024</a:t>
             </a:fld>
             <a:endParaRPr lang="en-US"/>
           </a:p>
@@ -8589,7 +8589,7 @@
             <a:fld id="{1C2D31DE-C454-491C-B5C3-F097855E3DF7}" type="datetime4">
               <a:rPr lang="en-US" smtClean="0"/>
               <a:pPr/>
-              <a:t>January 31, 2024</a:t>
+              <a:t>March 12, 2024</a:t>
             </a:fld>
             <a:endParaRPr lang="en-US" dirty="0"/>
           </a:p>
@@ -11741,7 +11741,7 @@
           <a:p>
             <a:fld id="{5958763E-B898-436D-883D-03711491D54A}" type="datetimeFigureOut">
               <a:rPr lang="en-US" smtClean="0"/>
-              <a:t>1/31/2024</a:t>
+              <a:t>3/12/2024</a:t>
             </a:fld>
             <a:endParaRPr lang="en-US"/>
           </a:p>
@@ -11865,7 +11865,7 @@
           <a:p>
             <a:fld id="{5958763E-B898-436D-883D-03711491D54A}" type="datetimeFigureOut">
               <a:rPr lang="en-US" smtClean="0"/>
-              <a:t>1/31/2024</a:t>
+              <a:t>3/12/2024</a:t>
             </a:fld>
             <a:endParaRPr lang="en-US"/>
           </a:p>
@@ -11989,7 +11989,7 @@
           <a:p>
             <a:fld id="{5958763E-B898-436D-883D-03711491D54A}" type="datetimeFigureOut">
               <a:rPr lang="en-US" smtClean="0"/>
-              <a:t>1/31/2024</a:t>
+              <a:t>3/12/2024</a:t>
             </a:fld>
             <a:endParaRPr lang="en-US"/>
           </a:p>
@@ -12113,7 +12113,7 @@
           <a:p>
             <a:fld id="{5958763E-B898-436D-883D-03711491D54A}" type="datetimeFigureOut">
               <a:rPr lang="en-US" smtClean="0"/>
-              <a:t>1/31/2024</a:t>
+              <a:t>3/12/2024</a:t>
             </a:fld>
             <a:endParaRPr lang="en-US"/>
           </a:p>
@@ -12237,7 +12237,7 @@
           <a:p>
             <a:fld id="{5958763E-B898-436D-883D-03711491D54A}" type="datetimeFigureOut">
               <a:rPr lang="en-US" smtClean="0"/>
-              <a:t>1/31/2024</a:t>
+              <a:t>3/12/2024</a:t>
             </a:fld>
             <a:endParaRPr lang="en-US"/>
           </a:p>
@@ -12361,7 +12361,7 @@
           <a:p>
             <a:fld id="{5958763E-B898-436D-883D-03711491D54A}" type="datetimeFigureOut">
               <a:rPr lang="en-US" smtClean="0"/>
-              <a:t>1/31/2024</a:t>
+              <a:t>3/12/2024</a:t>
             </a:fld>
             <a:endParaRPr lang="en-US"/>
           </a:p>
@@ -12485,7 +12485,7 @@
           <a:p>
             <a:fld id="{5958763E-B898-436D-883D-03711491D54A}" type="datetimeFigureOut">
               <a:rPr lang="en-US" smtClean="0"/>
-              <a:t>1/31/2024</a:t>
+              <a:t>3/12/2024</a:t>
             </a:fld>
             <a:endParaRPr lang="en-US"/>
           </a:p>
@@ -12609,7 +12609,7 @@
           <a:p>
             <a:fld id="{5958763E-B898-436D-883D-03711491D54A}" type="datetimeFigureOut">
               <a:rPr lang="en-US" smtClean="0"/>
-              <a:t>1/31/2024</a:t>
+              <a:t>3/12/2024</a:t>
             </a:fld>
             <a:endParaRPr lang="en-US"/>
           </a:p>
@@ -12742,7 +12742,7 @@
           <a:p>
             <a:fld id="{5958763E-B898-436D-883D-03711491D54A}" type="datetimeFigureOut">
               <a:rPr lang="en-US" smtClean="0"/>
-              <a:t>1/31/2024</a:t>
+              <a:t>3/12/2024</a:t>
             </a:fld>
             <a:endParaRPr lang="en-US"/>
           </a:p>
@@ -16081,7 +16081,7 @@
             <a:fld id="{1C2D31DE-C454-491C-B5C3-F097855E3DF7}" type="datetime4">
               <a:rPr lang="en-US" smtClean="0"/>
               <a:pPr/>
-              <a:t>January 31, 2024</a:t>
+              <a:t>March 12, 2024</a:t>
             </a:fld>
             <a:endParaRPr lang="en-US" dirty="0"/>
           </a:p>
@@ -28317,7 +28317,7 @@
           <a:p>
             <a:fld id="{5958763E-B898-436D-883D-03711491D54A}" type="datetimeFigureOut">
               <a:rPr lang="en-US" smtClean="0"/>
-              <a:t>1/31/2024</a:t>
+              <a:t>3/12/2024</a:t>
             </a:fld>
             <a:endParaRPr lang="en-US"/>
           </a:p>
@@ -28719,7 +28719,7 @@
           <a:p>
             <a:fld id="{5958763E-B898-436D-883D-03711491D54A}" type="datetimeFigureOut">
               <a:rPr lang="en-US" smtClean="0"/>
-              <a:t>1/31/2024</a:t>
+              <a:t>3/12/2024</a:t>
             </a:fld>
             <a:endParaRPr lang="en-US"/>
           </a:p>
@@ -29013,7 +29013,7 @@
           <a:p>
             <a:fld id="{5958763E-B898-436D-883D-03711491D54A}" type="datetimeFigureOut">
               <a:rPr lang="en-US" smtClean="0"/>
-              <a:t>1/31/2024</a:t>
+              <a:t>3/12/2024</a:t>
             </a:fld>
             <a:endParaRPr lang="en-US"/>
           </a:p>
@@ -29214,7 +29214,7 @@
           <a:p>
             <a:fld id="{5958763E-B898-436D-883D-03711491D54A}" type="datetimeFigureOut">
               <a:rPr lang="en-US" smtClean="0"/>
-              <a:t>1/31/2024</a:t>
+              <a:t>3/12/2024</a:t>
             </a:fld>
             <a:endParaRPr lang="en-US"/>
           </a:p>
@@ -29475,7 +29475,7 @@
           <a:p>
             <a:fld id="{5958763E-B898-436D-883D-03711491D54A}" type="datetimeFigureOut">
               <a:rPr lang="en-US" smtClean="0"/>
-              <a:t>1/31/2024</a:t>
+              <a:t>3/12/2024</a:t>
             </a:fld>
             <a:endParaRPr lang="en-US"/>
           </a:p>
@@ -29983,7 +29983,7 @@
           <a:p>
             <a:fld id="{5958763E-B898-436D-883D-03711491D54A}" type="datetimeFigureOut">
               <a:rPr lang="en-US" smtClean="0"/>
-              <a:t>1/31/2024</a:t>
+              <a:t>3/12/2024</a:t>
             </a:fld>
             <a:endParaRPr lang="en-US"/>
           </a:p>
@@ -30462,7 +30462,7 @@
           <a:p>
             <a:fld id="{5958763E-B898-436D-883D-03711491D54A}" type="datetimeFigureOut">
               <a:rPr lang="en-US" smtClean="0"/>
-              <a:t>1/31/2024</a:t>
+              <a:t>3/12/2024</a:t>
             </a:fld>
             <a:endParaRPr lang="en-US"/>
           </a:p>
@@ -31281,7 +31281,7 @@
           <a:p>
             <a:fld id="{5958763E-B898-436D-883D-03711491D54A}" type="datetimeFigureOut">
               <a:rPr lang="en-US" smtClean="0"/>
-              <a:t>1/31/2024</a:t>
+              <a:t>3/12/2024</a:t>
             </a:fld>
             <a:endParaRPr lang="en-US"/>
           </a:p>
@@ -31482,7 +31482,7 @@
           <a:p>
             <a:fld id="{5958763E-B898-436D-883D-03711491D54A}" type="datetimeFigureOut">
               <a:rPr lang="en-US" smtClean="0"/>
-              <a:t>1/31/2024</a:t>
+              <a:t>3/12/2024</a:t>
             </a:fld>
             <a:endParaRPr lang="en-US"/>
           </a:p>
@@ -31817,7 +31817,7 @@
           <a:p>
             <a:fld id="{5958763E-B898-436D-883D-03711491D54A}" type="datetimeFigureOut">
               <a:rPr lang="en-US" smtClean="0"/>
-              <a:t>1/31/2024</a:t>
+              <a:t>3/12/2024</a:t>
             </a:fld>
             <a:endParaRPr lang="en-US"/>
           </a:p>
@@ -32047,7 +32047,7 @@
           <a:p>
             <a:fld id="{5958763E-B898-436D-883D-03711491D54A}" type="datetimeFigureOut">
               <a:rPr lang="en-US" smtClean="0"/>
-              <a:t>1/31/2024</a:t>
+              <a:t>3/12/2024</a:t>
             </a:fld>
             <a:endParaRPr lang="en-US"/>
           </a:p>
@@ -32291,7 +32291,7 @@
           <a:p>
             <a:fld id="{5958763E-B898-436D-883D-03711491D54A}" type="datetimeFigureOut">
               <a:rPr lang="en-US" smtClean="0"/>
-              <a:t>1/31/2024</a:t>
+              <a:t>3/12/2024</a:t>
             </a:fld>
             <a:endParaRPr lang="en-US"/>
           </a:p>
@@ -37611,7 +37611,7 @@
             </a:pPr>
             <a:r>
               <a:rPr lang="en-US" dirty="0"/>
-              <a:t>Name, Name, Name, Name</a:t>
+              <a:t>Aiden, Anika, Lola, Ceri, Diego, Keegan</a:t>
             </a:r>
           </a:p>
           <a:p>
@@ -37642,7 +37642,7 @@
             </a:pPr>
             <a:r>
               <a:rPr lang="en-US" dirty="0"/>
-              <a:t>Name, Name, Name, Name</a:t>
+              <a:t>Alicia, Connor, George, Leonardo, Naomi</a:t>
             </a:r>
           </a:p>
           <a:p>
@@ -37672,10 +37672,9 @@
               <a:buNone/>
             </a:pPr>
             <a:r>
-              <a:rPr lang="en-US"/>
-              <a:t>Name, Name, Name, Name</a:t>
+              <a:rPr lang="en-US" dirty="0"/>
+              <a:t>All Virtual Students</a:t>
             </a:r>
-            <a:endParaRPr lang="en-US" dirty="0"/>
           </a:p>
           <a:p>
             <a:pPr marL="57150" indent="0">

</xml_diff>

<commit_message>
Update gitbook 2024-03-12 20:24:33
</commit_message>
<xml_diff>
--- a/Buttons/Review.pptx
+++ b/Buttons/Review.pptx
@@ -224,7 +224,7 @@
           <a:p>
             <a:fld id="{19104133-B5B0-4351-8158-4F0E5EB1E2BF}" type="datetimeFigureOut">
               <a:rPr lang="en-US" smtClean="0"/>
-              <a:t>1/31/2024</a:t>
+              <a:t>3/12/2024</a:t>
             </a:fld>
             <a:endParaRPr lang="en-US"/>
           </a:p>
@@ -1225,7 +1225,7 @@
             <a:fld id="{1C2D31DE-C454-491C-B5C3-F097855E3DF7}" type="datetime4">
               <a:rPr lang="en-US" smtClean="0"/>
               <a:pPr/>
-              <a:t>January 31, 2024</a:t>
+              <a:t>March 12, 2024</a:t>
             </a:fld>
             <a:endParaRPr lang="en-US" dirty="0"/>
           </a:p>
@@ -4617,7 +4617,7 @@
           <a:p>
             <a:fld id="{5958763E-B898-436D-883D-03711491D54A}" type="datetimeFigureOut">
               <a:rPr lang="en-US" smtClean="0"/>
-              <a:t>1/31/2024</a:t>
+              <a:t>3/12/2024</a:t>
             </a:fld>
             <a:endParaRPr lang="en-US"/>
           </a:p>
@@ -4810,7 +4810,7 @@
           <a:p>
             <a:fld id="{5958763E-B898-436D-883D-03711491D54A}" type="datetimeFigureOut">
               <a:rPr lang="en-US" smtClean="0"/>
-              <a:t>1/31/2024</a:t>
+              <a:t>3/12/2024</a:t>
             </a:fld>
             <a:endParaRPr lang="en-US"/>
           </a:p>
@@ -5060,7 +5060,7 @@
           <a:p>
             <a:fld id="{5958763E-B898-436D-883D-03711491D54A}" type="datetimeFigureOut">
               <a:rPr lang="en-US" smtClean="0"/>
-              <a:t>1/31/2024</a:t>
+              <a:t>3/12/2024</a:t>
             </a:fld>
             <a:endParaRPr lang="en-US"/>
           </a:p>
@@ -5408,7 +5408,7 @@
           <a:p>
             <a:fld id="{5958763E-B898-436D-883D-03711491D54A}" type="datetimeFigureOut">
               <a:rPr lang="en-US" smtClean="0"/>
-              <a:t>1/31/2024</a:t>
+              <a:t>3/12/2024</a:t>
             </a:fld>
             <a:endParaRPr lang="en-US"/>
           </a:p>
@@ -5824,7 +5824,7 @@
           <a:p>
             <a:fld id="{5958763E-B898-436D-883D-03711491D54A}" type="datetimeFigureOut">
               <a:rPr lang="en-US" smtClean="0"/>
-              <a:t>1/31/2024</a:t>
+              <a:t>3/12/2024</a:t>
             </a:fld>
             <a:endParaRPr lang="en-US"/>
           </a:p>
@@ -6325,7 +6325,7 @@
           <a:p>
             <a:fld id="{5958763E-B898-436D-883D-03711491D54A}" type="datetimeFigureOut">
               <a:rPr lang="en-US" smtClean="0"/>
-              <a:t>1/31/2024</a:t>
+              <a:t>3/12/2024</a:t>
             </a:fld>
             <a:endParaRPr lang="en-US"/>
           </a:p>
@@ -6776,7 +6776,7 @@
           <a:p>
             <a:fld id="{5958763E-B898-436D-883D-03711491D54A}" type="datetimeFigureOut">
               <a:rPr lang="en-US" smtClean="0"/>
-              <a:t>1/31/2024</a:t>
+              <a:t>3/12/2024</a:t>
             </a:fld>
             <a:endParaRPr lang="en-US"/>
           </a:p>
@@ -7387,7 +7387,7 @@
           <a:p>
             <a:fld id="{5958763E-B898-436D-883D-03711491D54A}" type="datetimeFigureOut">
               <a:rPr lang="en-US" smtClean="0"/>
-              <a:t>1/31/2024</a:t>
+              <a:t>3/12/2024</a:t>
             </a:fld>
             <a:endParaRPr lang="en-US"/>
           </a:p>
@@ -8158,7 +8158,7 @@
           <a:p>
             <a:fld id="{5958763E-B898-436D-883D-03711491D54A}" type="datetimeFigureOut">
               <a:rPr lang="en-US" smtClean="0"/>
-              <a:t>1/31/2024</a:t>
+              <a:t>3/12/2024</a:t>
             </a:fld>
             <a:endParaRPr lang="en-US"/>
           </a:p>
@@ -8262,7 +8262,7 @@
           <a:p>
             <a:fld id="{5958763E-B898-436D-883D-03711491D54A}" type="datetimeFigureOut">
               <a:rPr lang="en-US" smtClean="0"/>
-              <a:t>1/31/2024</a:t>
+              <a:t>3/12/2024</a:t>
             </a:fld>
             <a:endParaRPr lang="en-US"/>
           </a:p>
@@ -8589,7 +8589,7 @@
             <a:fld id="{1C2D31DE-C454-491C-B5C3-F097855E3DF7}" type="datetime4">
               <a:rPr lang="en-US" smtClean="0"/>
               <a:pPr/>
-              <a:t>January 31, 2024</a:t>
+              <a:t>March 12, 2024</a:t>
             </a:fld>
             <a:endParaRPr lang="en-US" dirty="0"/>
           </a:p>
@@ -11741,7 +11741,7 @@
           <a:p>
             <a:fld id="{5958763E-B898-436D-883D-03711491D54A}" type="datetimeFigureOut">
               <a:rPr lang="en-US" smtClean="0"/>
-              <a:t>1/31/2024</a:t>
+              <a:t>3/12/2024</a:t>
             </a:fld>
             <a:endParaRPr lang="en-US"/>
           </a:p>
@@ -11865,7 +11865,7 @@
           <a:p>
             <a:fld id="{5958763E-B898-436D-883D-03711491D54A}" type="datetimeFigureOut">
               <a:rPr lang="en-US" smtClean="0"/>
-              <a:t>1/31/2024</a:t>
+              <a:t>3/12/2024</a:t>
             </a:fld>
             <a:endParaRPr lang="en-US"/>
           </a:p>
@@ -11989,7 +11989,7 @@
           <a:p>
             <a:fld id="{5958763E-B898-436D-883D-03711491D54A}" type="datetimeFigureOut">
               <a:rPr lang="en-US" smtClean="0"/>
-              <a:t>1/31/2024</a:t>
+              <a:t>3/12/2024</a:t>
             </a:fld>
             <a:endParaRPr lang="en-US"/>
           </a:p>
@@ -12113,7 +12113,7 @@
           <a:p>
             <a:fld id="{5958763E-B898-436D-883D-03711491D54A}" type="datetimeFigureOut">
               <a:rPr lang="en-US" smtClean="0"/>
-              <a:t>1/31/2024</a:t>
+              <a:t>3/12/2024</a:t>
             </a:fld>
             <a:endParaRPr lang="en-US"/>
           </a:p>
@@ -12237,7 +12237,7 @@
           <a:p>
             <a:fld id="{5958763E-B898-436D-883D-03711491D54A}" type="datetimeFigureOut">
               <a:rPr lang="en-US" smtClean="0"/>
-              <a:t>1/31/2024</a:t>
+              <a:t>3/12/2024</a:t>
             </a:fld>
             <a:endParaRPr lang="en-US"/>
           </a:p>
@@ -12361,7 +12361,7 @@
           <a:p>
             <a:fld id="{5958763E-B898-436D-883D-03711491D54A}" type="datetimeFigureOut">
               <a:rPr lang="en-US" smtClean="0"/>
-              <a:t>1/31/2024</a:t>
+              <a:t>3/12/2024</a:t>
             </a:fld>
             <a:endParaRPr lang="en-US"/>
           </a:p>
@@ -12485,7 +12485,7 @@
           <a:p>
             <a:fld id="{5958763E-B898-436D-883D-03711491D54A}" type="datetimeFigureOut">
               <a:rPr lang="en-US" smtClean="0"/>
-              <a:t>1/31/2024</a:t>
+              <a:t>3/12/2024</a:t>
             </a:fld>
             <a:endParaRPr lang="en-US"/>
           </a:p>
@@ -12609,7 +12609,7 @@
           <a:p>
             <a:fld id="{5958763E-B898-436D-883D-03711491D54A}" type="datetimeFigureOut">
               <a:rPr lang="en-US" smtClean="0"/>
-              <a:t>1/31/2024</a:t>
+              <a:t>3/12/2024</a:t>
             </a:fld>
             <a:endParaRPr lang="en-US"/>
           </a:p>
@@ -12742,7 +12742,7 @@
           <a:p>
             <a:fld id="{5958763E-B898-436D-883D-03711491D54A}" type="datetimeFigureOut">
               <a:rPr lang="en-US" smtClean="0"/>
-              <a:t>1/31/2024</a:t>
+              <a:t>3/12/2024</a:t>
             </a:fld>
             <a:endParaRPr lang="en-US"/>
           </a:p>
@@ -16081,7 +16081,7 @@
             <a:fld id="{1C2D31DE-C454-491C-B5C3-F097855E3DF7}" type="datetime4">
               <a:rPr lang="en-US" smtClean="0"/>
               <a:pPr/>
-              <a:t>January 31, 2024</a:t>
+              <a:t>March 12, 2024</a:t>
             </a:fld>
             <a:endParaRPr lang="en-US" dirty="0"/>
           </a:p>
@@ -28317,7 +28317,7 @@
           <a:p>
             <a:fld id="{5958763E-B898-436D-883D-03711491D54A}" type="datetimeFigureOut">
               <a:rPr lang="en-US" smtClean="0"/>
-              <a:t>1/31/2024</a:t>
+              <a:t>3/12/2024</a:t>
             </a:fld>
             <a:endParaRPr lang="en-US"/>
           </a:p>
@@ -28719,7 +28719,7 @@
           <a:p>
             <a:fld id="{5958763E-B898-436D-883D-03711491D54A}" type="datetimeFigureOut">
               <a:rPr lang="en-US" smtClean="0"/>
-              <a:t>1/31/2024</a:t>
+              <a:t>3/12/2024</a:t>
             </a:fld>
             <a:endParaRPr lang="en-US"/>
           </a:p>
@@ -29013,7 +29013,7 @@
           <a:p>
             <a:fld id="{5958763E-B898-436D-883D-03711491D54A}" type="datetimeFigureOut">
               <a:rPr lang="en-US" smtClean="0"/>
-              <a:t>1/31/2024</a:t>
+              <a:t>3/12/2024</a:t>
             </a:fld>
             <a:endParaRPr lang="en-US"/>
           </a:p>
@@ -29214,7 +29214,7 @@
           <a:p>
             <a:fld id="{5958763E-B898-436D-883D-03711491D54A}" type="datetimeFigureOut">
               <a:rPr lang="en-US" smtClean="0"/>
-              <a:t>1/31/2024</a:t>
+              <a:t>3/12/2024</a:t>
             </a:fld>
             <a:endParaRPr lang="en-US"/>
           </a:p>
@@ -29475,7 +29475,7 @@
           <a:p>
             <a:fld id="{5958763E-B898-436D-883D-03711491D54A}" type="datetimeFigureOut">
               <a:rPr lang="en-US" smtClean="0"/>
-              <a:t>1/31/2024</a:t>
+              <a:t>3/12/2024</a:t>
             </a:fld>
             <a:endParaRPr lang="en-US"/>
           </a:p>
@@ -29983,7 +29983,7 @@
           <a:p>
             <a:fld id="{5958763E-B898-436D-883D-03711491D54A}" type="datetimeFigureOut">
               <a:rPr lang="en-US" smtClean="0"/>
-              <a:t>1/31/2024</a:t>
+              <a:t>3/12/2024</a:t>
             </a:fld>
             <a:endParaRPr lang="en-US"/>
           </a:p>
@@ -30462,7 +30462,7 @@
           <a:p>
             <a:fld id="{5958763E-B898-436D-883D-03711491D54A}" type="datetimeFigureOut">
               <a:rPr lang="en-US" smtClean="0"/>
-              <a:t>1/31/2024</a:t>
+              <a:t>3/12/2024</a:t>
             </a:fld>
             <a:endParaRPr lang="en-US"/>
           </a:p>
@@ -31281,7 +31281,7 @@
           <a:p>
             <a:fld id="{5958763E-B898-436D-883D-03711491D54A}" type="datetimeFigureOut">
               <a:rPr lang="en-US" smtClean="0"/>
-              <a:t>1/31/2024</a:t>
+              <a:t>3/12/2024</a:t>
             </a:fld>
             <a:endParaRPr lang="en-US"/>
           </a:p>
@@ -31482,7 +31482,7 @@
           <a:p>
             <a:fld id="{5958763E-B898-436D-883D-03711491D54A}" type="datetimeFigureOut">
               <a:rPr lang="en-US" smtClean="0"/>
-              <a:t>1/31/2024</a:t>
+              <a:t>3/12/2024</a:t>
             </a:fld>
             <a:endParaRPr lang="en-US"/>
           </a:p>
@@ -31817,7 +31817,7 @@
           <a:p>
             <a:fld id="{5958763E-B898-436D-883D-03711491D54A}" type="datetimeFigureOut">
               <a:rPr lang="en-US" smtClean="0"/>
-              <a:t>1/31/2024</a:t>
+              <a:t>3/12/2024</a:t>
             </a:fld>
             <a:endParaRPr lang="en-US"/>
           </a:p>
@@ -32047,7 +32047,7 @@
           <a:p>
             <a:fld id="{5958763E-B898-436D-883D-03711491D54A}" type="datetimeFigureOut">
               <a:rPr lang="en-US" smtClean="0"/>
-              <a:t>1/31/2024</a:t>
+              <a:t>3/12/2024</a:t>
             </a:fld>
             <a:endParaRPr lang="en-US"/>
           </a:p>
@@ -32291,7 +32291,7 @@
           <a:p>
             <a:fld id="{5958763E-B898-436D-883D-03711491D54A}" type="datetimeFigureOut">
               <a:rPr lang="en-US" smtClean="0"/>
-              <a:t>1/31/2024</a:t>
+              <a:t>3/12/2024</a:t>
             </a:fld>
             <a:endParaRPr lang="en-US"/>
           </a:p>
@@ -37611,7 +37611,7 @@
             </a:pPr>
             <a:r>
               <a:rPr lang="en-US" dirty="0"/>
-              <a:t>Name, Name, Name, Name</a:t>
+              <a:t>Aiden, Anika, Lola, Ceri, Diego, Keegan</a:t>
             </a:r>
           </a:p>
           <a:p>
@@ -37642,7 +37642,7 @@
             </a:pPr>
             <a:r>
               <a:rPr lang="en-US" dirty="0"/>
-              <a:t>Name, Name, Name, Name</a:t>
+              <a:t>Alicia, Connor, George, Leonardo, Naomi</a:t>
             </a:r>
           </a:p>
           <a:p>
@@ -37672,10 +37672,9 @@
               <a:buNone/>
             </a:pPr>
             <a:r>
-              <a:rPr lang="en-US"/>
-              <a:t>Name, Name, Name, Name</a:t>
+              <a:rPr lang="en-US" dirty="0"/>
+              <a:t>All Virtual Students</a:t>
             </a:r>
-            <a:endParaRPr lang="en-US" dirty="0"/>
           </a:p>
           <a:p>
             <a:pPr marL="57150" indent="0">

</xml_diff>

<commit_message>
Update gitbook 2025-09-24 17:50:31
</commit_message>
<xml_diff>
--- a/Buttons/Review.pptx
+++ b/Buttons/Review.pptx
@@ -249,7 +249,7 @@
           <a:p>
             <a:fld id="{19104133-B5B0-4351-8158-4F0E5EB1E2BF}" type="datetimeFigureOut">
               <a:rPr lang="en-US" smtClean="0"/>
-              <a:t>8/6/2025</a:t>
+              <a:t>9/24/2025</a:t>
             </a:fld>
             <a:endParaRPr lang="en-US"/>
           </a:p>
@@ -3785,7 +3785,7 @@
             <a:fld id="{1C2D31DE-C454-491C-B5C3-F097855E3DF7}" type="datetime4">
               <a:rPr lang="en-US" smtClean="0"/>
               <a:pPr/>
-              <a:t>August 6, 2025</a:t>
+              <a:t>September 24, 2025</a:t>
             </a:fld>
             <a:endParaRPr lang="en-US" dirty="0"/>
           </a:p>
@@ -7177,7 +7177,7 @@
           <a:p>
             <a:fld id="{5958763E-B898-436D-883D-03711491D54A}" type="datetimeFigureOut">
               <a:rPr lang="en-US" smtClean="0"/>
-              <a:t>8/6/2025</a:t>
+              <a:t>9/24/2025</a:t>
             </a:fld>
             <a:endParaRPr lang="en-US"/>
           </a:p>
@@ -7370,7 +7370,7 @@
           <a:p>
             <a:fld id="{5958763E-B898-436D-883D-03711491D54A}" type="datetimeFigureOut">
               <a:rPr lang="en-US" smtClean="0"/>
-              <a:t>8/6/2025</a:t>
+              <a:t>9/24/2025</a:t>
             </a:fld>
             <a:endParaRPr lang="en-US"/>
           </a:p>
@@ -7620,7 +7620,7 @@
           <a:p>
             <a:fld id="{5958763E-B898-436D-883D-03711491D54A}" type="datetimeFigureOut">
               <a:rPr lang="en-US" smtClean="0"/>
-              <a:t>8/6/2025</a:t>
+              <a:t>9/24/2025</a:t>
             </a:fld>
             <a:endParaRPr lang="en-US"/>
           </a:p>
@@ -7968,7 +7968,7 @@
           <a:p>
             <a:fld id="{5958763E-B898-436D-883D-03711491D54A}" type="datetimeFigureOut">
               <a:rPr lang="en-US" smtClean="0"/>
-              <a:t>8/6/2025</a:t>
+              <a:t>9/24/2025</a:t>
             </a:fld>
             <a:endParaRPr lang="en-US"/>
           </a:p>
@@ -8384,7 +8384,7 @@
           <a:p>
             <a:fld id="{5958763E-B898-436D-883D-03711491D54A}" type="datetimeFigureOut">
               <a:rPr lang="en-US" smtClean="0"/>
-              <a:t>8/6/2025</a:t>
+              <a:t>9/24/2025</a:t>
             </a:fld>
             <a:endParaRPr lang="en-US"/>
           </a:p>
@@ -8885,7 +8885,7 @@
           <a:p>
             <a:fld id="{5958763E-B898-436D-883D-03711491D54A}" type="datetimeFigureOut">
               <a:rPr lang="en-US" smtClean="0"/>
-              <a:t>8/6/2025</a:t>
+              <a:t>9/24/2025</a:t>
             </a:fld>
             <a:endParaRPr lang="en-US"/>
           </a:p>
@@ -9336,7 +9336,7 @@
           <a:p>
             <a:fld id="{5958763E-B898-436D-883D-03711491D54A}" type="datetimeFigureOut">
               <a:rPr lang="en-US" smtClean="0"/>
-              <a:t>8/6/2025</a:t>
+              <a:t>9/24/2025</a:t>
             </a:fld>
             <a:endParaRPr lang="en-US"/>
           </a:p>
@@ -9947,7 +9947,7 @@
           <a:p>
             <a:fld id="{5958763E-B898-436D-883D-03711491D54A}" type="datetimeFigureOut">
               <a:rPr lang="en-US" smtClean="0"/>
-              <a:t>8/6/2025</a:t>
+              <a:t>9/24/2025</a:t>
             </a:fld>
             <a:endParaRPr lang="en-US"/>
           </a:p>
@@ -10718,7 +10718,7 @@
           <a:p>
             <a:fld id="{5958763E-B898-436D-883D-03711491D54A}" type="datetimeFigureOut">
               <a:rPr lang="en-US" smtClean="0"/>
-              <a:t>8/6/2025</a:t>
+              <a:t>9/24/2025</a:t>
             </a:fld>
             <a:endParaRPr lang="en-US"/>
           </a:p>
@@ -10822,7 +10822,7 @@
           <a:p>
             <a:fld id="{5958763E-B898-436D-883D-03711491D54A}" type="datetimeFigureOut">
               <a:rPr lang="en-US" smtClean="0"/>
-              <a:t>8/6/2025</a:t>
+              <a:t>9/24/2025</a:t>
             </a:fld>
             <a:endParaRPr lang="en-US"/>
           </a:p>
@@ -11149,7 +11149,7 @@
             <a:fld id="{1C2D31DE-C454-491C-B5C3-F097855E3DF7}" type="datetime4">
               <a:rPr lang="en-US" smtClean="0"/>
               <a:pPr/>
-              <a:t>August 6, 2025</a:t>
+              <a:t>September 24, 2025</a:t>
             </a:fld>
             <a:endParaRPr lang="en-US" dirty="0"/>
           </a:p>
@@ -14301,7 +14301,7 @@
           <a:p>
             <a:fld id="{5958763E-B898-436D-883D-03711491D54A}" type="datetimeFigureOut">
               <a:rPr lang="en-US" smtClean="0"/>
-              <a:t>8/6/2025</a:t>
+              <a:t>9/24/2025</a:t>
             </a:fld>
             <a:endParaRPr lang="en-US"/>
           </a:p>
@@ -14425,7 +14425,7 @@
           <a:p>
             <a:fld id="{5958763E-B898-436D-883D-03711491D54A}" type="datetimeFigureOut">
               <a:rPr lang="en-US" smtClean="0"/>
-              <a:t>8/6/2025</a:t>
+              <a:t>9/24/2025</a:t>
             </a:fld>
             <a:endParaRPr lang="en-US"/>
           </a:p>
@@ -14549,7 +14549,7 @@
           <a:p>
             <a:fld id="{5958763E-B898-436D-883D-03711491D54A}" type="datetimeFigureOut">
               <a:rPr lang="en-US" smtClean="0"/>
-              <a:t>8/6/2025</a:t>
+              <a:t>9/24/2025</a:t>
             </a:fld>
             <a:endParaRPr lang="en-US"/>
           </a:p>
@@ -14673,7 +14673,7 @@
           <a:p>
             <a:fld id="{5958763E-B898-436D-883D-03711491D54A}" type="datetimeFigureOut">
               <a:rPr lang="en-US" smtClean="0"/>
-              <a:t>8/6/2025</a:t>
+              <a:t>9/24/2025</a:t>
             </a:fld>
             <a:endParaRPr lang="en-US"/>
           </a:p>
@@ -14797,7 +14797,7 @@
           <a:p>
             <a:fld id="{5958763E-B898-436D-883D-03711491D54A}" type="datetimeFigureOut">
               <a:rPr lang="en-US" smtClean="0"/>
-              <a:t>8/6/2025</a:t>
+              <a:t>9/24/2025</a:t>
             </a:fld>
             <a:endParaRPr lang="en-US"/>
           </a:p>
@@ -14921,7 +14921,7 @@
           <a:p>
             <a:fld id="{5958763E-B898-436D-883D-03711491D54A}" type="datetimeFigureOut">
               <a:rPr lang="en-US" smtClean="0"/>
-              <a:t>8/6/2025</a:t>
+              <a:t>9/24/2025</a:t>
             </a:fld>
             <a:endParaRPr lang="en-US"/>
           </a:p>
@@ -15045,7 +15045,7 @@
           <a:p>
             <a:fld id="{5958763E-B898-436D-883D-03711491D54A}" type="datetimeFigureOut">
               <a:rPr lang="en-US" smtClean="0"/>
-              <a:t>8/6/2025</a:t>
+              <a:t>9/24/2025</a:t>
             </a:fld>
             <a:endParaRPr lang="en-US"/>
           </a:p>
@@ -15169,7 +15169,7 @@
           <a:p>
             <a:fld id="{5958763E-B898-436D-883D-03711491D54A}" type="datetimeFigureOut">
               <a:rPr lang="en-US" smtClean="0"/>
-              <a:t>8/6/2025</a:t>
+              <a:t>9/24/2025</a:t>
             </a:fld>
             <a:endParaRPr lang="en-US"/>
           </a:p>
@@ -15302,7 +15302,7 @@
           <a:p>
             <a:fld id="{5958763E-B898-436D-883D-03711491D54A}" type="datetimeFigureOut">
               <a:rPr lang="en-US" smtClean="0"/>
-              <a:t>8/6/2025</a:t>
+              <a:t>9/24/2025</a:t>
             </a:fld>
             <a:endParaRPr lang="en-US"/>
           </a:p>
@@ -18641,7 +18641,7 @@
             <a:fld id="{1C2D31DE-C454-491C-B5C3-F097855E3DF7}" type="datetime4">
               <a:rPr lang="en-US" smtClean="0"/>
               <a:pPr/>
-              <a:t>August 6, 2025</a:t>
+              <a:t>September 24, 2025</a:t>
             </a:fld>
             <a:endParaRPr lang="en-US" dirty="0"/>
           </a:p>
@@ -30877,7 +30877,7 @@
           <a:p>
             <a:fld id="{5958763E-B898-436D-883D-03711491D54A}" type="datetimeFigureOut">
               <a:rPr lang="en-US" smtClean="0"/>
-              <a:t>8/6/2025</a:t>
+              <a:t>9/24/2025</a:t>
             </a:fld>
             <a:endParaRPr lang="en-US"/>
           </a:p>
@@ -31279,7 +31279,7 @@
           <a:p>
             <a:fld id="{5958763E-B898-436D-883D-03711491D54A}" type="datetimeFigureOut">
               <a:rPr lang="en-US" smtClean="0"/>
-              <a:t>8/6/2025</a:t>
+              <a:t>9/24/2025</a:t>
             </a:fld>
             <a:endParaRPr lang="en-US"/>
           </a:p>
@@ -31573,7 +31573,7 @@
           <a:p>
             <a:fld id="{5958763E-B898-436D-883D-03711491D54A}" type="datetimeFigureOut">
               <a:rPr lang="en-US" smtClean="0"/>
-              <a:t>8/6/2025</a:t>
+              <a:t>9/24/2025</a:t>
             </a:fld>
             <a:endParaRPr lang="en-US"/>
           </a:p>
@@ -31774,7 +31774,7 @@
           <a:p>
             <a:fld id="{5958763E-B898-436D-883D-03711491D54A}" type="datetimeFigureOut">
               <a:rPr lang="en-US" smtClean="0"/>
-              <a:t>8/6/2025</a:t>
+              <a:t>9/24/2025</a:t>
             </a:fld>
             <a:endParaRPr lang="en-US"/>
           </a:p>
@@ -32035,7 +32035,7 @@
           <a:p>
             <a:fld id="{5958763E-B898-436D-883D-03711491D54A}" type="datetimeFigureOut">
               <a:rPr lang="en-US" smtClean="0"/>
-              <a:t>8/6/2025</a:t>
+              <a:t>9/24/2025</a:t>
             </a:fld>
             <a:endParaRPr lang="en-US"/>
           </a:p>
@@ -32543,7 +32543,7 @@
           <a:p>
             <a:fld id="{5958763E-B898-436D-883D-03711491D54A}" type="datetimeFigureOut">
               <a:rPr lang="en-US" smtClean="0"/>
-              <a:t>8/6/2025</a:t>
+              <a:t>9/24/2025</a:t>
             </a:fld>
             <a:endParaRPr lang="en-US"/>
           </a:p>
@@ -33022,7 +33022,7 @@
           <a:p>
             <a:fld id="{5958763E-B898-436D-883D-03711491D54A}" type="datetimeFigureOut">
               <a:rPr lang="en-US" smtClean="0"/>
-              <a:t>8/6/2025</a:t>
+              <a:t>9/24/2025</a:t>
             </a:fld>
             <a:endParaRPr lang="en-US"/>
           </a:p>
@@ -33841,7 +33841,7 @@
           <a:p>
             <a:fld id="{5958763E-B898-436D-883D-03711491D54A}" type="datetimeFigureOut">
               <a:rPr lang="en-US" smtClean="0"/>
-              <a:t>8/6/2025</a:t>
+              <a:t>9/24/2025</a:t>
             </a:fld>
             <a:endParaRPr lang="en-US"/>
           </a:p>
@@ -34042,7 +34042,7 @@
           <a:p>
             <a:fld id="{5958763E-B898-436D-883D-03711491D54A}" type="datetimeFigureOut">
               <a:rPr lang="en-US" smtClean="0"/>
-              <a:t>8/6/2025</a:t>
+              <a:t>9/24/2025</a:t>
             </a:fld>
             <a:endParaRPr lang="en-US"/>
           </a:p>
@@ -34377,7 +34377,7 @@
           <a:p>
             <a:fld id="{5958763E-B898-436D-883D-03711491D54A}" type="datetimeFigureOut">
               <a:rPr lang="en-US" smtClean="0"/>
-              <a:t>8/6/2025</a:t>
+              <a:t>9/24/2025</a:t>
             </a:fld>
             <a:endParaRPr lang="en-US"/>
           </a:p>
@@ -34607,7 +34607,7 @@
           <a:p>
             <a:fld id="{5958763E-B898-436D-883D-03711491D54A}" type="datetimeFigureOut">
               <a:rPr lang="en-US" smtClean="0"/>
-              <a:t>8/6/2025</a:t>
+              <a:t>9/24/2025</a:t>
             </a:fld>
             <a:endParaRPr lang="en-US"/>
           </a:p>
@@ -34851,7 +34851,7 @@
           <a:p>
             <a:fld id="{5958763E-B898-436D-883D-03711491D54A}" type="datetimeFigureOut">
               <a:rPr lang="en-US" smtClean="0"/>
-              <a:t>8/6/2025</a:t>
+              <a:t>9/24/2025</a:t>
             </a:fld>
             <a:endParaRPr lang="en-US"/>
           </a:p>
@@ -43207,13 +43207,22 @@
               <a:buNone/>
             </a:pPr>
             <a:r>
+              <a:rPr lang="en-US" sz="11500" b="1">
+                <a:solidFill>
+                  <a:schemeClr val="accent2"/>
+                </a:solidFill>
+                <a:latin typeface="+mj-lt"/>
+              </a:rPr>
+              <a:t>9.</a:t>
+            </a:r>
+            <a:r>
               <a:rPr lang="en-US" sz="11500" b="1" dirty="0">
                 <a:solidFill>
                   <a:schemeClr val="accent2"/>
                 </a:solidFill>
                 <a:latin typeface="+mj-lt"/>
               </a:rPr>
-              <a:t>8</a:t>
+              <a:t>5</a:t>
             </a:r>
             <a:endParaRPr lang="en-US" sz="7200" b="1" dirty="0">
               <a:solidFill>

</xml_diff>